<commit_message>
UI design is updated by removing redandant files
</commit_message>
<xml_diff>
--- a/jpm-wm-project-execution/2_Design/JPM_presentation.pptx
+++ b/jpm-wm-project-execution/2_Design/JPM_presentation.pptx
@@ -8,20 +8,22 @@
     <p:notesMasterId r:id="rId4"/>
   </p:notesMasterIdLst>
   <p:handoutMasterIdLst>
-    <p:handoutMasterId r:id="rId15"/>
+    <p:handoutMasterId r:id="rId17"/>
   </p:handoutMasterIdLst>
   <p:sldIdLst>
     <p:sldId id="256" r:id="rId3"/>
-    <p:sldId id="257" r:id="rId5"/>
-    <p:sldId id="271" r:id="rId6"/>
-    <p:sldId id="258" r:id="rId7"/>
-    <p:sldId id="259" r:id="rId8"/>
-    <p:sldId id="265" r:id="rId9"/>
-    <p:sldId id="260" r:id="rId10"/>
-    <p:sldId id="261" r:id="rId11"/>
-    <p:sldId id="262" r:id="rId12"/>
-    <p:sldId id="263" r:id="rId13"/>
-    <p:sldId id="264" r:id="rId14"/>
+    <p:sldId id="272" r:id="rId5"/>
+    <p:sldId id="257" r:id="rId6"/>
+    <p:sldId id="273" r:id="rId7"/>
+    <p:sldId id="271" r:id="rId8"/>
+    <p:sldId id="258" r:id="rId9"/>
+    <p:sldId id="259" r:id="rId10"/>
+    <p:sldId id="265" r:id="rId11"/>
+    <p:sldId id="260" r:id="rId12"/>
+    <p:sldId id="261" r:id="rId13"/>
+    <p:sldId id="262" r:id="rId14"/>
+    <p:sldId id="263" r:id="rId15"/>
+    <p:sldId id="264" r:id="rId16"/>
   </p:sldIdLst>
   <p:sldSz cx="12192000" cy="6858000"/>
   <p:notesSz cx="7103745" cy="10234295"/>
@@ -123,12 +125,12 @@
   <p:extLst>
     <p:ext uri="{EFAFB233-063F-42B5-8137-9DF3F51BA10A}">
       <p15:sldGuideLst xmlns:p15="http://schemas.microsoft.com/office/powerpoint/2012/main">
-        <p15:guide id="1" orient="horz" pos="2156" userDrawn="1">
+        <p15:guide id="1" orient="horz" pos="2127" userDrawn="1">
           <p15:clr>
             <a:srgbClr val="A4A3A4"/>
           </p15:clr>
         </p15:guide>
-        <p15:guide id="2" pos="3840" userDrawn="1">
+        <p15:guide id="2" pos="3815" userDrawn="1">
           <p15:clr>
             <a:srgbClr val="A4A3A4"/>
           </p15:clr>
@@ -3538,8 +3540,8 @@
         </p:nvSpPr>
         <p:spPr>
           <a:xfrm>
-            <a:off x="1524000" y="2519680"/>
-            <a:ext cx="9144000" cy="989965"/>
+            <a:off x="1442720" y="1030605"/>
+            <a:ext cx="9225280" cy="641350"/>
           </a:xfrm>
         </p:spPr>
         <p:txBody>
@@ -3555,45 +3557,252 @@
               <a:rPr lang="en-US" altLang="en-US"/>
             </a:br>
             <a:r>
-              <a:rPr lang="en-US" altLang="en-US"/>
-              <a:t>Job Category: Software Engineering</a:t>
-            </a:r>
-            <a:br>
-              <a:rPr lang="en-US" altLang="en-US"/>
-            </a:br>
+              <a:rPr lang="en-US" altLang="en-US" sz="3110"/>
+              <a:t>Next-Gen Wealth Management: A Cloud-Native Platform for Secure, Scalable Private Banking</a:t>
+            </a:r>
             <a:endParaRPr lang="en-US" altLang="en-US"/>
           </a:p>
         </p:txBody>
       </p:sp>
       <p:sp>
         <p:nvSpPr>
-          <p:cNvPr id="5" name="副标题 4"/>
-          <p:cNvSpPr>
-            <a:spLocks noGrp="1"/>
-          </p:cNvSpPr>
-          <p:nvPr>
-            <p:ph type="subTitle" idx="1"/>
-          </p:nvPr>
-        </p:nvSpPr>
-        <p:spPr/>
-        <p:txBody>
-          <a:bodyPr/>
-          <a:lstStyle/>
-          <a:p>
-            <a:r>
-              <a:rPr lang="en-US" altLang="en-US">
-                <a:sym typeface="+mn-ea"/>
-              </a:rPr>
-              <a:t>Business Unit: Asset &amp; Wealth Management</a:t>
-            </a:r>
-            <a:br>
-              <a:rPr lang="en-US" altLang="en-US">
-                <a:sym typeface="+mn-ea"/>
-              </a:rPr>
-            </a:br>
+          <p:cNvPr id="3" name="副标题 4"/>
+          <p:cNvSpPr>
+            <a:spLocks noGrp="1"/>
+          </p:cNvSpPr>
+          <p:nvPr/>
+        </p:nvSpPr>
+        <p:spPr>
+          <a:xfrm>
+            <a:off x="1651000" y="2079625"/>
+            <a:ext cx="9144000" cy="641350"/>
+          </a:xfrm>
+          <a:prstGeom prst="rect">
+            <a:avLst/>
+          </a:prstGeom>
+        </p:spPr>
+        <p:txBody>
+          <a:bodyPr vert="horz" lIns="91440" tIns="45720" rIns="91440" bIns="45720" rtlCol="0">
+            <a:normAutofit/>
+          </a:bodyPr>
+          <a:lstStyle>
+            <a:lvl1pPr marL="0" indent="0" algn="ctr" defTabSz="914400" rtl="0" eaLnBrk="1" latinLnBrk="0" hangingPunct="1">
+              <a:lnSpc>
+                <a:spcPct val="90000"/>
+              </a:lnSpc>
+              <a:spcBef>
+                <a:spcPts val="1000"/>
+              </a:spcBef>
+              <a:buFont typeface="Arial" panose="020B0604020202090204" pitchFamily="34" charset="0"/>
+              <a:buNone/>
+              <a:defRPr sz="2400" kern="1200">
+                <a:solidFill>
+                  <a:schemeClr val="tx1">
+                    <a:lumMod val="75000"/>
+                    <a:lumOff val="25000"/>
+                  </a:schemeClr>
+                </a:solidFill>
+                <a:effectLst/>
+                <a:latin typeface="+mn-ea"/>
+                <a:ea typeface="+mn-ea"/>
+                <a:cs typeface="+mn-cs"/>
+              </a:defRPr>
+            </a:lvl1pPr>
+            <a:lvl2pPr marL="457200" indent="0" algn="ctr" defTabSz="914400" rtl="0" eaLnBrk="1" latinLnBrk="0" hangingPunct="1">
+              <a:lnSpc>
+                <a:spcPct val="90000"/>
+              </a:lnSpc>
+              <a:spcBef>
+                <a:spcPts val="500"/>
+              </a:spcBef>
+              <a:buFont typeface="Arial" panose="020B0604020202090204" pitchFamily="34" charset="0"/>
+              <a:buNone/>
+              <a:defRPr sz="2000" kern="1200">
+                <a:solidFill>
+                  <a:schemeClr val="tx1"/>
+                </a:solidFill>
+                <a:latin typeface="+mn-lt"/>
+                <a:ea typeface="+mn-ea"/>
+                <a:cs typeface="+mn-cs"/>
+              </a:defRPr>
+            </a:lvl2pPr>
+            <a:lvl3pPr marL="914400" indent="0" algn="ctr" defTabSz="914400" rtl="0" eaLnBrk="1" latinLnBrk="0" hangingPunct="1">
+              <a:lnSpc>
+                <a:spcPct val="90000"/>
+              </a:lnSpc>
+              <a:spcBef>
+                <a:spcPts val="500"/>
+              </a:spcBef>
+              <a:buFont typeface="Arial" panose="020B0604020202090204" pitchFamily="34" charset="0"/>
+              <a:buNone/>
+              <a:defRPr sz="1800" kern="1200">
+                <a:solidFill>
+                  <a:schemeClr val="tx1"/>
+                </a:solidFill>
+                <a:latin typeface="+mn-lt"/>
+                <a:ea typeface="+mn-ea"/>
+                <a:cs typeface="+mn-cs"/>
+              </a:defRPr>
+            </a:lvl3pPr>
+            <a:lvl4pPr marL="1371600" indent="0" algn="ctr" defTabSz="914400" rtl="0" eaLnBrk="1" latinLnBrk="0" hangingPunct="1">
+              <a:lnSpc>
+                <a:spcPct val="90000"/>
+              </a:lnSpc>
+              <a:spcBef>
+                <a:spcPts val="500"/>
+              </a:spcBef>
+              <a:buFont typeface="Arial" panose="020B0604020202090204" pitchFamily="34" charset="0"/>
+              <a:buNone/>
+              <a:defRPr sz="1600" kern="1200">
+                <a:solidFill>
+                  <a:schemeClr val="tx1"/>
+                </a:solidFill>
+                <a:latin typeface="+mn-lt"/>
+                <a:ea typeface="+mn-ea"/>
+                <a:cs typeface="+mn-cs"/>
+              </a:defRPr>
+            </a:lvl4pPr>
+            <a:lvl5pPr marL="1828800" indent="0" algn="ctr" defTabSz="914400" rtl="0" eaLnBrk="1" latinLnBrk="0" hangingPunct="1">
+              <a:lnSpc>
+                <a:spcPct val="90000"/>
+              </a:lnSpc>
+              <a:spcBef>
+                <a:spcPts val="500"/>
+              </a:spcBef>
+              <a:buFont typeface="Arial" panose="020B0604020202090204" pitchFamily="34" charset="0"/>
+              <a:buNone/>
+              <a:defRPr sz="1600" kern="1200">
+                <a:solidFill>
+                  <a:schemeClr val="tx1"/>
+                </a:solidFill>
+                <a:latin typeface="+mn-lt"/>
+                <a:ea typeface="+mn-ea"/>
+                <a:cs typeface="+mn-cs"/>
+              </a:defRPr>
+            </a:lvl5pPr>
+            <a:lvl6pPr marL="2286000" indent="0" algn="ctr" defTabSz="914400" rtl="0" eaLnBrk="1" latinLnBrk="0" hangingPunct="1">
+              <a:lnSpc>
+                <a:spcPct val="90000"/>
+              </a:lnSpc>
+              <a:spcBef>
+                <a:spcPts val="500"/>
+              </a:spcBef>
+              <a:buFont typeface="Arial" panose="020B0604020202090204" pitchFamily="34" charset="0"/>
+              <a:buNone/>
+              <a:defRPr sz="1600" kern="1200">
+                <a:solidFill>
+                  <a:schemeClr val="tx1"/>
+                </a:solidFill>
+                <a:latin typeface="+mn-lt"/>
+                <a:ea typeface="+mn-ea"/>
+                <a:cs typeface="+mn-cs"/>
+              </a:defRPr>
+            </a:lvl6pPr>
+            <a:lvl7pPr marL="2743200" indent="0" algn="ctr" defTabSz="914400" rtl="0" eaLnBrk="1" latinLnBrk="0" hangingPunct="1">
+              <a:lnSpc>
+                <a:spcPct val="90000"/>
+              </a:lnSpc>
+              <a:spcBef>
+                <a:spcPts val="500"/>
+              </a:spcBef>
+              <a:buFont typeface="Arial" panose="020B0604020202090204" pitchFamily="34" charset="0"/>
+              <a:buNone/>
+              <a:defRPr sz="1600" kern="1200">
+                <a:solidFill>
+                  <a:schemeClr val="tx1"/>
+                </a:solidFill>
+                <a:latin typeface="+mn-lt"/>
+                <a:ea typeface="+mn-ea"/>
+                <a:cs typeface="+mn-cs"/>
+              </a:defRPr>
+            </a:lvl7pPr>
+            <a:lvl8pPr marL="3200400" indent="0" algn="ctr" defTabSz="914400" rtl="0" eaLnBrk="1" latinLnBrk="0" hangingPunct="1">
+              <a:lnSpc>
+                <a:spcPct val="90000"/>
+              </a:lnSpc>
+              <a:spcBef>
+                <a:spcPts val="500"/>
+              </a:spcBef>
+              <a:buFont typeface="Arial" panose="020B0604020202090204" pitchFamily="34" charset="0"/>
+              <a:buNone/>
+              <a:defRPr sz="1600" kern="1200">
+                <a:solidFill>
+                  <a:schemeClr val="tx1"/>
+                </a:solidFill>
+                <a:latin typeface="+mn-lt"/>
+                <a:ea typeface="+mn-ea"/>
+                <a:cs typeface="+mn-cs"/>
+              </a:defRPr>
+            </a:lvl8pPr>
+            <a:lvl9pPr marL="3657600" indent="0" algn="ctr" defTabSz="914400" rtl="0" eaLnBrk="1" latinLnBrk="0" hangingPunct="1">
+              <a:lnSpc>
+                <a:spcPct val="90000"/>
+              </a:lnSpc>
+              <a:spcBef>
+                <a:spcPts val="500"/>
+              </a:spcBef>
+              <a:buFont typeface="Arial" panose="020B0604020202090204" pitchFamily="34" charset="0"/>
+              <a:buNone/>
+              <a:defRPr sz="1600" kern="1200">
+                <a:solidFill>
+                  <a:schemeClr val="tx1"/>
+                </a:solidFill>
+                <a:latin typeface="+mn-lt"/>
+                <a:ea typeface="+mn-ea"/>
+                <a:cs typeface="+mn-cs"/>
+              </a:defRPr>
+            </a:lvl9pPr>
+          </a:lstStyle>
+          <a:p>
             <a:endParaRPr lang="zh-CN" altLang="en-US" dirty="0">
               <a:latin typeface="+mn-lt"/>
             </a:endParaRPr>
+          </a:p>
+        </p:txBody>
+      </p:sp>
+      <p:pic>
+        <p:nvPicPr>
+          <p:cNvPr id="4" name="Picture 3" descr="jpwm-logo"/>
+          <p:cNvPicPr>
+            <a:picLocks noChangeAspect="1"/>
+          </p:cNvPicPr>
+          <p:nvPr/>
+        </p:nvPicPr>
+        <p:blipFill>
+          <a:blip r:embed="rId1">
+            <a:extLst>
+              <a:ext uri="{96DAC541-7B7A-43D3-8B79-37D633B846F1}">
+                <asvg:svgBlip xmlns:asvg="http://schemas.microsoft.com/office/drawing/2016/SVG/main" r:embed="rId2"/>
+              </a:ext>
+            </a:extLst>
+          </a:blip>
+          <a:stretch>
+            <a:fillRect/>
+          </a:stretch>
+        </p:blipFill>
+        <p:spPr>
+          <a:xfrm>
+            <a:off x="1442720" y="2395220"/>
+            <a:ext cx="8604885" cy="868045"/>
+          </a:xfrm>
+          <a:prstGeom prst="rect">
+            <a:avLst/>
+          </a:prstGeom>
+        </p:spPr>
+      </p:pic>
+      <p:sp>
+        <p:nvSpPr>
+          <p:cNvPr id="6" name="Subtitle 5"/>
+          <p:cNvSpPr/>
+          <p:nvPr>
+            <p:ph type="subTitle" idx="1"/>
+          </p:nvPr>
+        </p:nvSpPr>
+        <p:spPr/>
+        <p:txBody>
+          <a:bodyPr/>
+          <a:p>
+            <a:endParaRPr lang="en-US"/>
           </a:p>
         </p:txBody>
       </p:sp>
@@ -3628,7 +3837,7 @@
         <p:spPr>
           <a:xfrm>
             <a:off x="647700" y="258445"/>
-            <a:ext cx="10515600" cy="550545"/>
+            <a:ext cx="10515600" cy="443230"/>
           </a:xfrm>
         </p:spPr>
         <p:txBody>
@@ -3638,7 +3847,7 @@
           <a:p>
             <a:r>
               <a:rPr lang="en-US"/>
-              <a:t>Monitoring</a:t>
+              <a:t>Demo:</a:t>
             </a:r>
             <a:endParaRPr lang="en-US"/>
           </a:p>
@@ -3690,6 +3899,136 @@
             <p:ph type="title"/>
           </p:nvPr>
         </p:nvSpPr>
+        <p:spPr>
+          <a:xfrm>
+            <a:off x="647700" y="258445"/>
+            <a:ext cx="10515600" cy="610235"/>
+          </a:xfrm>
+        </p:spPr>
+        <p:txBody>
+          <a:bodyPr>
+            <a:normAutofit fontScale="90000"/>
+          </a:bodyPr>
+          <a:p>
+            <a:r>
+              <a:rPr lang="en-US"/>
+              <a:t>Reports</a:t>
+            </a:r>
+            <a:endParaRPr lang="en-US"/>
+          </a:p>
+        </p:txBody>
+      </p:sp>
+      <p:sp>
+        <p:nvSpPr>
+          <p:cNvPr id="3" name="Content Placeholder 2"/>
+          <p:cNvSpPr>
+            <a:spLocks noGrp="1"/>
+          </p:cNvSpPr>
+          <p:nvPr>
+            <p:ph idx="1"/>
+          </p:nvPr>
+        </p:nvSpPr>
+        <p:spPr/>
+        <p:txBody>
+          <a:bodyPr/>
+          <a:p>
+            <a:endParaRPr lang="en-US"/>
+          </a:p>
+        </p:txBody>
+      </p:sp>
+    </p:spTree>
+  </p:cSld>
+  <p:clrMapOvr>
+    <a:masterClrMapping/>
+  </p:clrMapOvr>
+</p:sld>
+</file>
+
+<file path=ppt/slides/slide12.xml><?xml version="1.0" encoding="utf-8"?>
+<p:sld xmlns:a="http://schemas.openxmlformats.org/drawingml/2006/main" xmlns:r="http://schemas.openxmlformats.org/officeDocument/2006/relationships" xmlns:p="http://schemas.openxmlformats.org/presentationml/2006/main">
+  <p:cSld>
+    <p:spTree>
+      <p:nvGrpSpPr>
+        <p:cNvPr id="1" name=""/>
+        <p:cNvGrpSpPr/>
+        <p:nvPr/>
+      </p:nvGrpSpPr>
+      <p:grpSpPr/>
+      <p:sp>
+        <p:nvSpPr>
+          <p:cNvPr id="2" name="Title 1"/>
+          <p:cNvSpPr>
+            <a:spLocks noGrp="1"/>
+          </p:cNvSpPr>
+          <p:nvPr>
+            <p:ph type="title"/>
+          </p:nvPr>
+        </p:nvSpPr>
+        <p:spPr>
+          <a:xfrm>
+            <a:off x="647700" y="258445"/>
+            <a:ext cx="10515600" cy="550545"/>
+          </a:xfrm>
+        </p:spPr>
+        <p:txBody>
+          <a:bodyPr>
+            <a:normAutofit fontScale="90000"/>
+          </a:bodyPr>
+          <a:p>
+            <a:r>
+              <a:rPr lang="en-US"/>
+              <a:t>Monitoring</a:t>
+            </a:r>
+            <a:endParaRPr lang="en-US"/>
+          </a:p>
+        </p:txBody>
+      </p:sp>
+      <p:sp>
+        <p:nvSpPr>
+          <p:cNvPr id="3" name="Content Placeholder 2"/>
+          <p:cNvSpPr>
+            <a:spLocks noGrp="1"/>
+          </p:cNvSpPr>
+          <p:nvPr>
+            <p:ph idx="1"/>
+          </p:nvPr>
+        </p:nvSpPr>
+        <p:spPr/>
+        <p:txBody>
+          <a:bodyPr/>
+          <a:p>
+            <a:endParaRPr lang="en-US"/>
+          </a:p>
+        </p:txBody>
+      </p:sp>
+    </p:spTree>
+  </p:cSld>
+  <p:clrMapOvr>
+    <a:masterClrMapping/>
+  </p:clrMapOvr>
+</p:sld>
+</file>
+
+<file path=ppt/slides/slide13.xml><?xml version="1.0" encoding="utf-8"?>
+<p:sld xmlns:a="http://schemas.openxmlformats.org/drawingml/2006/main" xmlns:r="http://schemas.openxmlformats.org/officeDocument/2006/relationships" xmlns:p="http://schemas.openxmlformats.org/presentationml/2006/main">
+  <p:cSld>
+    <p:spTree>
+      <p:nvGrpSpPr>
+        <p:cNvPr id="1" name=""/>
+        <p:cNvGrpSpPr/>
+        <p:nvPr/>
+      </p:nvGrpSpPr>
+      <p:grpSpPr/>
+      <p:sp>
+        <p:nvSpPr>
+          <p:cNvPr id="2" name="Title 1"/>
+          <p:cNvSpPr>
+            <a:spLocks noGrp="1"/>
+          </p:cNvSpPr>
+          <p:nvPr>
+            <p:ph type="title"/>
+          </p:nvPr>
+        </p:nvSpPr>
         <p:spPr/>
         <p:txBody>
           <a:bodyPr/>
@@ -3754,7 +4093,7 @@
           <a:p>
             <a:r>
               <a:rPr lang="en-US"/>
-              <a:t>Requirements</a:t>
+              <a:t>Wealth management platform</a:t>
             </a:r>
             <a:endParaRPr lang="en-US"/>
           </a:p>
@@ -3772,125 +4111,296 @@
         </p:nvSpPr>
         <p:spPr>
           <a:xfrm>
-            <a:off x="647700" y="1343660"/>
-            <a:ext cx="10515600" cy="4833620"/>
+            <a:off x="647700" y="1711325"/>
+            <a:ext cx="10119995" cy="955675"/>
           </a:xfrm>
         </p:spPr>
         <p:txBody>
-          <a:bodyPr>
-            <a:normAutofit fontScale="75000"/>
+          <a:bodyPr/>
+          <a:p>
+            <a:pPr marL="0" indent="0">
+              <a:buNone/>
+            </a:pPr>
+            <a:r>
+              <a:rPr lang="en-US" altLang="en-US"/>
+              <a:t>"Delivering private wealth management experiences through cloud-native innovation"</a:t>
+            </a:r>
+            <a:endParaRPr lang="en-US" altLang="en-US"/>
+          </a:p>
+        </p:txBody>
+      </p:sp>
+      <p:sp>
+        <p:nvSpPr>
+          <p:cNvPr id="6" name="Text Box 5"/>
+          <p:cNvSpPr txBox="1"/>
+          <p:nvPr/>
+        </p:nvSpPr>
+        <p:spPr>
+          <a:xfrm>
+            <a:off x="7520940" y="5695315"/>
+            <a:ext cx="3894455" cy="955040"/>
+          </a:xfrm>
+          <a:prstGeom prst="rect">
+            <a:avLst/>
+          </a:prstGeom>
+          <a:noFill/>
+        </p:spPr>
+        <p:txBody>
+          <a:bodyPr wrap="square" rtlCol="0">
+            <a:noAutofit/>
           </a:bodyPr>
           <a:p>
             <a:r>
               <a:rPr lang="en-US" altLang="en-US"/>
-              <a:t>Secure and High-Quality Code Developmen</a:t>
+              <a:t>System Analyst(Cloud Migration Specialist) | IT Solution Consultant | Tech Lead</a:t>
             </a:r>
             <a:endParaRPr lang="en-US" altLang="en-US"/>
           </a:p>
           <a:p>
-            <a:pPr lvl="1"/>
-            <a:r>
-              <a:rPr lang="en-US" altLang="en-US">
+            <a:endParaRPr lang="zh-CN" altLang="en-US"/>
+          </a:p>
+        </p:txBody>
+      </p:sp>
+      <p:sp>
+        <p:nvSpPr>
+          <p:cNvPr id="7" name="副标题 4"/>
+          <p:cNvSpPr>
+            <a:spLocks noGrp="1"/>
+          </p:cNvSpPr>
+          <p:nvPr/>
+        </p:nvSpPr>
+        <p:spPr>
+          <a:xfrm>
+            <a:off x="1024890" y="3011170"/>
+            <a:ext cx="9561830" cy="3072130"/>
+          </a:xfrm>
+          <a:prstGeom prst="rect">
+            <a:avLst/>
+          </a:prstGeom>
+        </p:spPr>
+        <p:txBody>
+          <a:bodyPr vert="horz" lIns="91440" tIns="45720" rIns="91440" bIns="45720" rtlCol="0">
+            <a:normAutofit/>
+          </a:bodyPr>
+          <a:lstStyle>
+            <a:lvl1pPr marL="0" indent="0" algn="ctr" defTabSz="914400" rtl="0" eaLnBrk="1" latinLnBrk="0" hangingPunct="1">
+              <a:lnSpc>
+                <a:spcPct val="90000"/>
+              </a:lnSpc>
+              <a:spcBef>
+                <a:spcPts val="1000"/>
+              </a:spcBef>
+              <a:buFont typeface="Arial" panose="020B0604020202090204" pitchFamily="34" charset="0"/>
+              <a:buNone/>
+              <a:defRPr sz="2400" kern="1200">
+                <a:solidFill>
+                  <a:schemeClr val="tx1">
+                    <a:lumMod val="75000"/>
+                    <a:lumOff val="25000"/>
+                  </a:schemeClr>
+                </a:solidFill>
+                <a:effectLst/>
+                <a:latin typeface="+mn-ea"/>
+                <a:ea typeface="+mn-ea"/>
+                <a:cs typeface="+mn-cs"/>
+              </a:defRPr>
+            </a:lvl1pPr>
+            <a:lvl2pPr marL="457200" indent="0" algn="ctr" defTabSz="914400" rtl="0" eaLnBrk="1" latinLnBrk="0" hangingPunct="1">
+              <a:lnSpc>
+                <a:spcPct val="90000"/>
+              </a:lnSpc>
+              <a:spcBef>
+                <a:spcPts val="500"/>
+              </a:spcBef>
+              <a:buFont typeface="Arial" panose="020B0604020202090204" pitchFamily="34" charset="0"/>
+              <a:buNone/>
+              <a:defRPr sz="2000" kern="1200">
+                <a:solidFill>
+                  <a:schemeClr val="tx1"/>
+                </a:solidFill>
+                <a:latin typeface="+mn-lt"/>
+                <a:ea typeface="+mn-ea"/>
+                <a:cs typeface="+mn-cs"/>
+              </a:defRPr>
+            </a:lvl2pPr>
+            <a:lvl3pPr marL="914400" indent="0" algn="ctr" defTabSz="914400" rtl="0" eaLnBrk="1" latinLnBrk="0" hangingPunct="1">
+              <a:lnSpc>
+                <a:spcPct val="90000"/>
+              </a:lnSpc>
+              <a:spcBef>
+                <a:spcPts val="500"/>
+              </a:spcBef>
+              <a:buFont typeface="Arial" panose="020B0604020202090204" pitchFamily="34" charset="0"/>
+              <a:buNone/>
+              <a:defRPr sz="1800" kern="1200">
+                <a:solidFill>
+                  <a:schemeClr val="tx1"/>
+                </a:solidFill>
+                <a:latin typeface="+mn-lt"/>
+                <a:ea typeface="+mn-ea"/>
+                <a:cs typeface="+mn-cs"/>
+              </a:defRPr>
+            </a:lvl3pPr>
+            <a:lvl4pPr marL="1371600" indent="0" algn="ctr" defTabSz="914400" rtl="0" eaLnBrk="1" latinLnBrk="0" hangingPunct="1">
+              <a:lnSpc>
+                <a:spcPct val="90000"/>
+              </a:lnSpc>
+              <a:spcBef>
+                <a:spcPts val="500"/>
+              </a:spcBef>
+              <a:buFont typeface="Arial" panose="020B0604020202090204" pitchFamily="34" charset="0"/>
+              <a:buNone/>
+              <a:defRPr sz="1600" kern="1200">
+                <a:solidFill>
+                  <a:schemeClr val="tx1"/>
+                </a:solidFill>
+                <a:latin typeface="+mn-lt"/>
+                <a:ea typeface="+mn-ea"/>
+                <a:cs typeface="+mn-cs"/>
+              </a:defRPr>
+            </a:lvl4pPr>
+            <a:lvl5pPr marL="1828800" indent="0" algn="ctr" defTabSz="914400" rtl="0" eaLnBrk="1" latinLnBrk="0" hangingPunct="1">
+              <a:lnSpc>
+                <a:spcPct val="90000"/>
+              </a:lnSpc>
+              <a:spcBef>
+                <a:spcPts val="500"/>
+              </a:spcBef>
+              <a:buFont typeface="Arial" panose="020B0604020202090204" pitchFamily="34" charset="0"/>
+              <a:buNone/>
+              <a:defRPr sz="1600" kern="1200">
+                <a:solidFill>
+                  <a:schemeClr val="tx1"/>
+                </a:solidFill>
+                <a:latin typeface="+mn-lt"/>
+                <a:ea typeface="+mn-ea"/>
+                <a:cs typeface="+mn-cs"/>
+              </a:defRPr>
+            </a:lvl5pPr>
+            <a:lvl6pPr marL="2286000" indent="0" algn="ctr" defTabSz="914400" rtl="0" eaLnBrk="1" latinLnBrk="0" hangingPunct="1">
+              <a:lnSpc>
+                <a:spcPct val="90000"/>
+              </a:lnSpc>
+              <a:spcBef>
+                <a:spcPts val="500"/>
+              </a:spcBef>
+              <a:buFont typeface="Arial" panose="020B0604020202090204" pitchFamily="34" charset="0"/>
+              <a:buNone/>
+              <a:defRPr sz="1600" kern="1200">
+                <a:solidFill>
+                  <a:schemeClr val="tx1"/>
+                </a:solidFill>
+                <a:latin typeface="+mn-lt"/>
+                <a:ea typeface="+mn-ea"/>
+                <a:cs typeface="+mn-cs"/>
+              </a:defRPr>
+            </a:lvl6pPr>
+            <a:lvl7pPr marL="2743200" indent="0" algn="ctr" defTabSz="914400" rtl="0" eaLnBrk="1" latinLnBrk="0" hangingPunct="1">
+              <a:lnSpc>
+                <a:spcPct val="90000"/>
+              </a:lnSpc>
+              <a:spcBef>
+                <a:spcPts val="500"/>
+              </a:spcBef>
+              <a:buFont typeface="Arial" panose="020B0604020202090204" pitchFamily="34" charset="0"/>
+              <a:buNone/>
+              <a:defRPr sz="1600" kern="1200">
+                <a:solidFill>
+                  <a:schemeClr val="tx1"/>
+                </a:solidFill>
+                <a:latin typeface="+mn-lt"/>
+                <a:ea typeface="+mn-ea"/>
+                <a:cs typeface="+mn-cs"/>
+              </a:defRPr>
+            </a:lvl7pPr>
+            <a:lvl8pPr marL="3200400" indent="0" algn="ctr" defTabSz="914400" rtl="0" eaLnBrk="1" latinLnBrk="0" hangingPunct="1">
+              <a:lnSpc>
+                <a:spcPct val="90000"/>
+              </a:lnSpc>
+              <a:spcBef>
+                <a:spcPts val="500"/>
+              </a:spcBef>
+              <a:buFont typeface="Arial" panose="020B0604020202090204" pitchFamily="34" charset="0"/>
+              <a:buNone/>
+              <a:defRPr sz="1600" kern="1200">
+                <a:solidFill>
+                  <a:schemeClr val="tx1"/>
+                </a:solidFill>
+                <a:latin typeface="+mn-lt"/>
+                <a:ea typeface="+mn-ea"/>
+                <a:cs typeface="+mn-cs"/>
+              </a:defRPr>
+            </a:lvl8pPr>
+            <a:lvl9pPr marL="3657600" indent="0" algn="ctr" defTabSz="914400" rtl="0" eaLnBrk="1" latinLnBrk="0" hangingPunct="1">
+              <a:lnSpc>
+                <a:spcPct val="90000"/>
+              </a:lnSpc>
+              <a:spcBef>
+                <a:spcPts val="500"/>
+              </a:spcBef>
+              <a:buFont typeface="Arial" panose="020B0604020202090204" pitchFamily="34" charset="0"/>
+              <a:buNone/>
+              <a:defRPr sz="1600" kern="1200">
+                <a:solidFill>
+                  <a:schemeClr val="tx1"/>
+                </a:solidFill>
+                <a:latin typeface="+mn-lt"/>
+                <a:ea typeface="+mn-ea"/>
+                <a:cs typeface="+mn-cs"/>
+              </a:defRPr>
+            </a:lvl9pPr>
+          </a:lstStyle>
+          <a:p>
+            <a:r>
+              <a:rPr lang="en-US" altLang="en-US"/>
+              <a:t>This demo showcases an end-to-end wealth management platform built with Spring Boot, React, and AWS, addressing key challenges in portfolio management, client-advisor collaboration, and regulatory compliance. The solution highlights my expertise in cloud migration, microservices architecture, and financial system security – directly applicable to JPMorgan's Global Private Banking Technology initiatives.</a:t>
+            </a:r>
+            <a:endParaRPr lang="en-US" altLang="en-US"/>
+          </a:p>
+        </p:txBody>
+      </p:sp>
+      <p:sp>
+        <p:nvSpPr>
+          <p:cNvPr id="8" name="Text Box 7"/>
+          <p:cNvSpPr txBox="1"/>
+          <p:nvPr/>
+        </p:nvSpPr>
+        <p:spPr>
+          <a:xfrm>
+            <a:off x="7533640" y="5255260"/>
+            <a:ext cx="2877185" cy="608330"/>
+          </a:xfrm>
+          <a:prstGeom prst="rect">
+            <a:avLst/>
+          </a:prstGeom>
+          <a:noFill/>
+        </p:spPr>
+        <p:txBody>
+          <a:bodyPr wrap="square" rtlCol="0">
+            <a:noAutofit/>
+          </a:bodyPr>
+          <a:p>
+            <a:r>
+              <a:rPr lang="en-US" sz="2800">
                 <a:sym typeface="+mn-ea"/>
               </a:rPr>
-              <a:t>Develop and maintain secure, high-quality production code using Spring (Java) or React (JS/TS).</a:t>
-            </a:r>
-            <a:endParaRPr lang="en-US" altLang="en-US"/>
-          </a:p>
-          <a:p>
-            <a:pPr lvl="1"/>
-            <a:r>
-              <a:rPr lang="en-US" altLang="en-US">
+              <a:t>By Girish(</a:t>
+            </a:r>
+            <a:r>
+              <a:rPr lang="zh-CN" altLang="en-US" sz="2800">
                 <a:sym typeface="+mn-ea"/>
               </a:rPr>
-              <a:t>Ensure code adheres to architecture and design patterns and meets all design constraints.</a:t>
-            </a:r>
-            <a:endParaRPr lang="en-US" altLang="en-US"/>
-          </a:p>
-          <a:p>
-            <a:pPr marL="0" lvl="1"/>
-            <a:r>
-              <a:rPr lang="en-US" altLang="en-US" sz="2800">
+              <a:t>吉里</a:t>
+            </a:r>
+            <a:r>
+              <a:rPr lang="en-US" altLang="zh-CN" sz="2800">
                 <a:sym typeface="+mn-ea"/>
               </a:rPr>
-              <a:t>Architecture </a:t>
-            </a:r>
-            <a:endParaRPr lang="en-US" altLang="en-US" sz="2800">
+              <a:t>)</a:t>
+            </a:r>
+            <a:endParaRPr lang="en-US" altLang="zh-CN" sz="2800">
               <a:sym typeface="+mn-ea"/>
             </a:endParaRPr>
-          </a:p>
-          <a:p>
-            <a:pPr lvl="1"/>
-            <a:r>
-              <a:rPr lang="en-US" altLang="en-US" sz="2330">
-                <a:sym typeface="+mn-ea"/>
-              </a:rPr>
-              <a:t>HLD</a:t>
-            </a:r>
-            <a:endParaRPr lang="en-US" altLang="en-US" sz="2330"/>
-          </a:p>
-          <a:p>
-            <a:pPr lvl="1"/>
-            <a:r>
-              <a:rPr lang="en-US" altLang="en-US" sz="2330">
-                <a:sym typeface="+mn-ea"/>
-              </a:rPr>
-              <a:t>LLD</a:t>
-            </a:r>
-            <a:endParaRPr lang="en-US" altLang="en-US" sz="2330">
-              <a:sym typeface="+mn-ea"/>
-            </a:endParaRPr>
-          </a:p>
-          <a:p>
-            <a:pPr marL="0" lvl="1"/>
-            <a:r>
-              <a:rPr lang="en-US" altLang="en-US" sz="2800"/>
-              <a:t>Coding Standards and setup</a:t>
-            </a:r>
-            <a:endParaRPr lang="en-US" altLang="en-US" sz="2800"/>
-          </a:p>
-          <a:p>
-            <a:pPr marL="0" lvl="1"/>
-            <a:r>
-              <a:rPr lang="en-US" altLang="en-US" sz="2800"/>
-              <a:t>Implementations</a:t>
-            </a:r>
-            <a:endParaRPr lang="en-US" altLang="en-US" sz="2800"/>
-          </a:p>
-          <a:p>
-            <a:pPr lvl="1" algn="l">
-              <a:buClrTx/>
-              <a:buSzTx/>
-            </a:pPr>
-            <a:r>
-              <a:rPr lang="en-US" altLang="en-US" sz="2330"/>
-              <a:t>Code Walk through</a:t>
-            </a:r>
-            <a:endParaRPr lang="en-US" altLang="en-US" sz="2095"/>
-          </a:p>
-          <a:p>
-            <a:pPr marL="0" lvl="1"/>
-            <a:r>
-              <a:rPr lang="en-US" altLang="en-US" sz="2800"/>
-              <a:t>Demo</a:t>
-            </a:r>
-            <a:endParaRPr lang="en-US" altLang="en-US" sz="2800"/>
-          </a:p>
-          <a:p>
-            <a:pPr marL="0" lvl="1"/>
-            <a:r>
-              <a:rPr lang="en-US" altLang="en-US" sz="2800"/>
-              <a:t>Report &amp; Monitoring</a:t>
-            </a:r>
-            <a:endParaRPr lang="en-US" altLang="en-US" sz="2800"/>
-          </a:p>
-          <a:p>
-            <a:pPr marL="0" lvl="1"/>
-            <a:r>
-              <a:rPr lang="en-US" altLang="en-US" sz="2800"/>
-              <a:t>Any questions?</a:t>
-            </a:r>
-            <a:endParaRPr lang="en-US" altLang="en-US"/>
           </a:p>
         </p:txBody>
       </p:sp>
@@ -3924,18 +4434,253 @@
         </p:nvSpPr>
         <p:spPr>
           <a:xfrm>
-            <a:off x="254000" y="88265"/>
-            <a:ext cx="5187950" cy="748665"/>
+            <a:off x="647700" y="258445"/>
+            <a:ext cx="6200775" cy="1325880"/>
           </a:xfrm>
         </p:spPr>
         <p:txBody>
           <a:bodyPr/>
           <a:p>
             <a:r>
-              <a:rPr lang="en-US"/>
-              <a:t>Planning-Execution</a:t>
+              <a:rPr lang="en-US" altLang="en-US"/>
+              <a:t>Business Requirements</a:t>
             </a:r>
             <a:endParaRPr lang="en-US"/>
+          </a:p>
+        </p:txBody>
+      </p:sp>
+      <p:sp>
+        <p:nvSpPr>
+          <p:cNvPr id="3" name="Content Placeholder 2"/>
+          <p:cNvSpPr>
+            <a:spLocks noGrp="1"/>
+          </p:cNvSpPr>
+          <p:nvPr>
+            <p:ph idx="1"/>
+          </p:nvPr>
+        </p:nvSpPr>
+        <p:spPr>
+          <a:xfrm>
+            <a:off x="647700" y="1343660"/>
+            <a:ext cx="10515600" cy="4833620"/>
+          </a:xfrm>
+        </p:spPr>
+        <p:txBody>
+          <a:bodyPr>
+            <a:normAutofit fontScale="75000"/>
+          </a:bodyPr>
+          <a:p>
+            <a:r>
+              <a:rPr lang="en-US" altLang="en-US"/>
+              <a:t>Scalable , Secure and High-Quality Code Development</a:t>
+            </a:r>
+            <a:endParaRPr lang="en-US" altLang="en-US"/>
+          </a:p>
+          <a:p>
+            <a:pPr lvl="1"/>
+            <a:r>
+              <a:rPr lang="en-US" altLang="en-US">
+                <a:sym typeface="+mn-ea"/>
+              </a:rPr>
+              <a:t>Develop and maintain secure, high-quality production code using Spring (Java) or React (JS/TS), mapstruct, Netflix DGS, GraphQL </a:t>
+            </a:r>
+            <a:endParaRPr lang="en-US" altLang="en-US"/>
+          </a:p>
+          <a:p>
+            <a:pPr lvl="1"/>
+            <a:r>
+              <a:rPr lang="en-US" altLang="en-US">
+                <a:sym typeface="+mn-ea"/>
+              </a:rPr>
+              <a:t>Ensure code adheres to architecture and design patterns and meets all design constraints.</a:t>
+            </a:r>
+            <a:endParaRPr lang="en-US" altLang="en-US"/>
+          </a:p>
+          <a:p>
+            <a:pPr marL="0" lvl="1"/>
+            <a:r>
+              <a:rPr lang="en-US" altLang="en-US" sz="2800">
+                <a:sym typeface="+mn-ea"/>
+              </a:rPr>
+              <a:t>Architecture </a:t>
+            </a:r>
+            <a:endParaRPr lang="en-US" altLang="en-US" sz="2800">
+              <a:sym typeface="+mn-ea"/>
+            </a:endParaRPr>
+          </a:p>
+          <a:p>
+            <a:pPr lvl="1"/>
+            <a:r>
+              <a:rPr lang="en-US" altLang="en-US" sz="2330">
+                <a:sym typeface="+mn-ea"/>
+              </a:rPr>
+              <a:t>HLD</a:t>
+            </a:r>
+            <a:endParaRPr lang="en-US" altLang="en-US" sz="2330"/>
+          </a:p>
+          <a:p>
+            <a:pPr lvl="1"/>
+            <a:r>
+              <a:rPr lang="en-US" altLang="en-US" sz="2330">
+                <a:sym typeface="+mn-ea"/>
+              </a:rPr>
+              <a:t>LLD</a:t>
+            </a:r>
+            <a:endParaRPr lang="en-US" altLang="en-US" sz="2330">
+              <a:sym typeface="+mn-ea"/>
+            </a:endParaRPr>
+          </a:p>
+          <a:p>
+            <a:pPr lvl="1"/>
+            <a:r>
+              <a:rPr lang="en-US" altLang="en-US" sz="2330">
+                <a:sym typeface="+mn-ea"/>
+              </a:rPr>
+              <a:t>UI design</a:t>
+            </a:r>
+            <a:endParaRPr lang="en-US" altLang="en-US" sz="2330">
+              <a:sym typeface="+mn-ea"/>
+            </a:endParaRPr>
+          </a:p>
+          <a:p>
+            <a:pPr lvl="1"/>
+            <a:r>
+              <a:rPr lang="en-US" altLang="en-US" sz="2330">
+                <a:sym typeface="+mn-ea"/>
+              </a:rPr>
+              <a:t>Data Design </a:t>
+            </a:r>
+            <a:endParaRPr lang="en-US" altLang="en-US" sz="2330">
+              <a:sym typeface="+mn-ea"/>
+            </a:endParaRPr>
+          </a:p>
+          <a:p>
+            <a:pPr marL="0" lvl="1"/>
+            <a:r>
+              <a:rPr lang="en-US" altLang="en-US" sz="2800"/>
+              <a:t>Coding Standards and setup</a:t>
+            </a:r>
+            <a:endParaRPr lang="en-US" altLang="en-US" sz="2800"/>
+          </a:p>
+          <a:p>
+            <a:pPr marL="0" lvl="1"/>
+            <a:r>
+              <a:rPr lang="en-US" altLang="en-US" sz="2800"/>
+              <a:t>Development roadmap</a:t>
+            </a:r>
+            <a:endParaRPr lang="en-US" altLang="en-US" sz="2800"/>
+          </a:p>
+          <a:p>
+            <a:pPr marL="0" lvl="1"/>
+            <a:r>
+              <a:rPr lang="en-US" altLang="en-US" sz="2800"/>
+              <a:t>Demo</a:t>
+            </a:r>
+            <a:endParaRPr lang="en-US" altLang="en-US" sz="2800"/>
+          </a:p>
+          <a:p>
+            <a:pPr marL="0" lvl="1"/>
+            <a:r>
+              <a:rPr lang="en-US" altLang="en-US" sz="2800"/>
+              <a:t>Report &amp; Monitoring</a:t>
+            </a:r>
+            <a:endParaRPr lang="en-US" altLang="en-US" sz="2800"/>
+          </a:p>
+          <a:p>
+            <a:pPr marL="0" lvl="1"/>
+            <a:r>
+              <a:rPr lang="en-US" altLang="en-US" sz="2800"/>
+              <a:t>Any questions?</a:t>
+            </a:r>
+            <a:endParaRPr lang="en-US" altLang="en-US"/>
+          </a:p>
+        </p:txBody>
+      </p:sp>
+      <p:sp>
+        <p:nvSpPr>
+          <p:cNvPr id="5" name="Text Box 4"/>
+          <p:cNvSpPr txBox="1"/>
+          <p:nvPr/>
+        </p:nvSpPr>
+        <p:spPr>
+          <a:xfrm>
+            <a:off x="949325" y="6176645"/>
+            <a:ext cx="9924415" cy="556895"/>
+          </a:xfrm>
+          <a:prstGeom prst="rect">
+            <a:avLst/>
+          </a:prstGeom>
+          <a:noFill/>
+        </p:spPr>
+        <p:txBody>
+          <a:bodyPr wrap="square" rtlCol="0">
+            <a:noAutofit/>
+          </a:bodyPr>
+          <a:p>
+            <a:r>
+              <a:rPr lang="en-US" altLang="en-US"/>
+              <a:t>"High-net-worth clients demand real-time portfolio visibility with military-grade security"</a:t>
+            </a:r>
+            <a:endParaRPr lang="en-US" altLang="en-US"/>
+          </a:p>
+        </p:txBody>
+      </p:sp>
+      <p:sp>
+        <p:nvSpPr>
+          <p:cNvPr id="6" name="Text Box 5"/>
+          <p:cNvSpPr txBox="1"/>
+          <p:nvPr/>
+        </p:nvSpPr>
+        <p:spPr>
+          <a:xfrm>
+            <a:off x="7099300" y="3131820"/>
+            <a:ext cx="4064000" cy="2318385"/>
+          </a:xfrm>
+          <a:prstGeom prst="rect">
+            <a:avLst/>
+          </a:prstGeom>
+          <a:noFill/>
+        </p:spPr>
+        <p:txBody>
+          <a:bodyPr wrap="square" rtlCol="0">
+            <a:noAutofit/>
+          </a:bodyPr>
+          <a:p>
+            <a:r>
+              <a:rPr lang="en-US" altLang="en-US"/>
+              <a:t>Key Features:</a:t>
+            </a:r>
+            <a:endParaRPr lang="en-US" altLang="en-US"/>
+          </a:p>
+          <a:p>
+            <a:endParaRPr lang="en-US" altLang="en-US"/>
+          </a:p>
+          <a:p>
+            <a:r>
+              <a:rPr lang="en-US" altLang="en-US"/>
+              <a:t>Role-based dashboards (Client/Advisor/Compliance)</a:t>
+            </a:r>
+            <a:endParaRPr lang="en-US" altLang="en-US"/>
+          </a:p>
+          <a:p>
+            <a:endParaRPr lang="en-US" altLang="en-US"/>
+          </a:p>
+          <a:p>
+            <a:r>
+              <a:rPr lang="en-US" altLang="en-US"/>
+              <a:t>AI-driven investment alerts</a:t>
+            </a:r>
+            <a:endParaRPr lang="en-US" altLang="en-US"/>
+          </a:p>
+          <a:p>
+            <a:endParaRPr lang="en-US" altLang="en-US"/>
+          </a:p>
+          <a:p>
+            <a:r>
+              <a:rPr lang="en-US" altLang="en-US"/>
+              <a:t>Audit trails for FINRA compliance</a:t>
+            </a:r>
+            <a:endParaRPr lang="en-US" altLang="en-US"/>
           </a:p>
         </p:txBody>
       </p:sp>
@@ -3957,9 +4702,1249 @@
         <p:nvPr/>
       </p:nvGrpSpPr>
       <p:grpSpPr/>
+      <p:sp>
+        <p:nvSpPr>
+          <p:cNvPr id="2" name="Title 1"/>
+          <p:cNvSpPr>
+            <a:spLocks noGrp="1"/>
+          </p:cNvSpPr>
+          <p:nvPr>
+            <p:ph type="title"/>
+          </p:nvPr>
+        </p:nvSpPr>
+        <p:spPr/>
+        <p:txBody>
+          <a:bodyPr/>
+          <a:p>
+            <a:r>
+              <a:rPr lang="en-US" altLang="en-US"/>
+              <a:t>Technical Analysis</a:t>
+            </a:r>
+            <a:endParaRPr lang="en-US" altLang="en-US"/>
+          </a:p>
+        </p:txBody>
+      </p:sp>
+      <p:graphicFrame>
+        <p:nvGraphicFramePr>
+          <p:cNvPr id="8" name="Table 7"/>
+          <p:cNvGraphicFramePr/>
+          <p:nvPr>
+            <p:custDataLst>
+              <p:tags r:id="rId1"/>
+            </p:custDataLst>
+          </p:nvPr>
+        </p:nvGraphicFramePr>
+        <p:xfrm>
+          <a:off x="991870" y="1584960"/>
+          <a:ext cx="7057390" cy="3628390"/>
+        </p:xfrm>
+        <a:graphic>
+          <a:graphicData uri="http://schemas.openxmlformats.org/drawingml/2006/table">
+            <a:tbl>
+              <a:tblPr/>
+              <a:tblGrid>
+                <a:gridCol w="1888490"/>
+                <a:gridCol w="2406650"/>
+                <a:gridCol w="2762250"/>
+              </a:tblGrid>
+              <a:tr h="878205">
+                <a:tc>
+                  <a:txBody>
+                    <a:bodyPr/>
+                    <a:p>
+                      <a:pPr algn="l" fontAlgn="ctr"/>
+                      <a:r>
+                        <a:rPr lang="en-US" altLang="zh-CN" sz="1200" b="0" i="0">
+                          <a:solidFill>
+                            <a:srgbClr val="404040"/>
+                          </a:solidFill>
+                          <a:latin typeface="Calibri"/>
+                          <a:ea typeface="Calibri"/>
+                        </a:rPr>
+                        <a:t>Requirement</a:t>
+                      </a:r>
+                      <a:endParaRPr lang="en-US" altLang="zh-CN" sz="1200" b="0" i="0">
+                        <a:solidFill>
+                          <a:srgbClr val="404040"/>
+                        </a:solidFill>
+                        <a:latin typeface="Calibri"/>
+                        <a:ea typeface="Calibri"/>
+                      </a:endParaRPr>
+                    </a:p>
+                  </a:txBody>
+                  <a:tcPr marL="13017" marR="13017" marT="13017" marB="0" anchor="ctr" anchorCtr="0">
+                    <a:lnL w="6350" cap="flat" cmpd="sng">
+                      <a:solidFill>
+                        <a:srgbClr val="000000"/>
+                      </a:solidFill>
+                      <a:prstDash val="solid"/>
+                      <a:headEnd type="none" w="med" len="med"/>
+                      <a:tailEnd type="none" w="med" len="med"/>
+                    </a:lnL>
+                    <a:lnR w="6350" cap="flat" cmpd="sng">
+                      <a:solidFill>
+                        <a:srgbClr val="000000"/>
+                      </a:solidFill>
+                      <a:prstDash val="solid"/>
+                      <a:headEnd type="none" w="med" len="med"/>
+                      <a:tailEnd type="none" w="med" len="med"/>
+                    </a:lnR>
+                    <a:lnT w="6350" cap="flat" cmpd="sng">
+                      <a:solidFill>
+                        <a:srgbClr val="000000"/>
+                      </a:solidFill>
+                      <a:prstDash val="solid"/>
+                      <a:headEnd type="none" w="med" len="med"/>
+                      <a:tailEnd type="none" w="med" len="med"/>
+                    </a:lnT>
+                    <a:lnB w="6350" cap="flat" cmpd="sng">
+                      <a:solidFill>
+                        <a:srgbClr val="000000"/>
+                      </a:solidFill>
+                      <a:prstDash val="solid"/>
+                      <a:headEnd type="none" w="med" len="med"/>
+                      <a:tailEnd type="none" w="med" len="med"/>
+                    </a:lnB>
+                    <a:solidFill>
+                      <a:srgbClr val="FFFF00"/>
+                    </a:solidFill>
+                  </a:tcPr>
+                </a:tc>
+                <a:tc>
+                  <a:txBody>
+                    <a:bodyPr/>
+                    <a:p>
+                      <a:pPr algn="l" fontAlgn="ctr"/>
+                      <a:r>
+                        <a:rPr lang="en-US" altLang="zh-CN" sz="1200" b="0" i="0">
+                          <a:solidFill>
+                            <a:srgbClr val="404040"/>
+                          </a:solidFill>
+                          <a:latin typeface="Calibri"/>
+                          <a:ea typeface="Calibri"/>
+                        </a:rPr>
+                        <a:t>Monolithic Approach</a:t>
+                      </a:r>
+                      <a:endParaRPr lang="en-US" altLang="zh-CN" sz="1200" b="0" i="0">
+                        <a:solidFill>
+                          <a:srgbClr val="404040"/>
+                        </a:solidFill>
+                        <a:latin typeface="Calibri"/>
+                        <a:ea typeface="Calibri"/>
+                      </a:endParaRPr>
+                    </a:p>
+                  </a:txBody>
+                  <a:tcPr marL="13017" marR="13017" marT="13017" marB="0" anchor="ctr" anchorCtr="0">
+                    <a:lnL w="6350" cap="flat" cmpd="sng">
+                      <a:solidFill>
+                        <a:srgbClr val="000000"/>
+                      </a:solidFill>
+                      <a:prstDash val="solid"/>
+                      <a:headEnd type="none" w="med" len="med"/>
+                      <a:tailEnd type="none" w="med" len="med"/>
+                    </a:lnL>
+                    <a:lnR w="6350" cap="flat" cmpd="sng">
+                      <a:solidFill>
+                        <a:srgbClr val="000000"/>
+                      </a:solidFill>
+                      <a:prstDash val="solid"/>
+                      <a:headEnd type="none" w="med" len="med"/>
+                      <a:tailEnd type="none" w="med" len="med"/>
+                    </a:lnR>
+                    <a:lnT w="6350" cap="flat" cmpd="sng">
+                      <a:solidFill>
+                        <a:srgbClr val="000000"/>
+                      </a:solidFill>
+                      <a:prstDash val="solid"/>
+                      <a:headEnd type="none" w="med" len="med"/>
+                      <a:tailEnd type="none" w="med" len="med"/>
+                    </a:lnT>
+                    <a:lnB w="6350" cap="flat" cmpd="sng">
+                      <a:solidFill>
+                        <a:srgbClr val="000000"/>
+                      </a:solidFill>
+                      <a:prstDash val="solid"/>
+                      <a:headEnd type="none" w="med" len="med"/>
+                      <a:tailEnd type="none" w="med" len="med"/>
+                    </a:lnB>
+                    <a:solidFill>
+                      <a:srgbClr val="FFFF00"/>
+                    </a:solidFill>
+                  </a:tcPr>
+                </a:tc>
+                <a:tc>
+                  <a:txBody>
+                    <a:bodyPr/>
+                    <a:p>
+                      <a:pPr algn="l" fontAlgn="ctr"/>
+                      <a:r>
+                        <a:rPr lang="en-US" altLang="zh-CN" sz="1200" b="0" i="0">
+                          <a:solidFill>
+                            <a:srgbClr val="404040"/>
+                          </a:solidFill>
+                          <a:latin typeface="Calibri"/>
+                          <a:ea typeface="Calibri"/>
+                        </a:rPr>
+                        <a:t>My Microservice Solution</a:t>
+                      </a:r>
+                      <a:endParaRPr lang="en-US" altLang="zh-CN" sz="1200" b="0" i="0">
+                        <a:solidFill>
+                          <a:srgbClr val="404040"/>
+                        </a:solidFill>
+                        <a:latin typeface="Calibri"/>
+                        <a:ea typeface="Calibri"/>
+                      </a:endParaRPr>
+                    </a:p>
+                  </a:txBody>
+                  <a:tcPr marL="13017" marR="13017" marT="13017" marB="0" anchor="ctr" anchorCtr="0">
+                    <a:lnL w="6350" cap="flat" cmpd="sng">
+                      <a:solidFill>
+                        <a:srgbClr val="000000"/>
+                      </a:solidFill>
+                      <a:prstDash val="solid"/>
+                      <a:headEnd type="none" w="med" len="med"/>
+                      <a:tailEnd type="none" w="med" len="med"/>
+                    </a:lnL>
+                    <a:lnR w="6350" cap="flat" cmpd="sng">
+                      <a:solidFill>
+                        <a:srgbClr val="000000"/>
+                      </a:solidFill>
+                      <a:prstDash val="solid"/>
+                      <a:headEnd type="none" w="med" len="med"/>
+                      <a:tailEnd type="none" w="med" len="med"/>
+                    </a:lnR>
+                    <a:lnT w="6350" cap="flat" cmpd="sng">
+                      <a:solidFill>
+                        <a:srgbClr val="000000"/>
+                      </a:solidFill>
+                      <a:prstDash val="solid"/>
+                      <a:headEnd type="none" w="med" len="med"/>
+                      <a:tailEnd type="none" w="med" len="med"/>
+                    </a:lnT>
+                    <a:lnB w="6350" cap="flat" cmpd="sng">
+                      <a:solidFill>
+                        <a:srgbClr val="000000"/>
+                      </a:solidFill>
+                      <a:prstDash val="solid"/>
+                      <a:headEnd type="none" w="med" len="med"/>
+                      <a:tailEnd type="none" w="med" len="med"/>
+                    </a:lnB>
+                    <a:solidFill>
+                      <a:srgbClr val="FFFF00"/>
+                    </a:solidFill>
+                  </a:tcPr>
+                </a:tc>
+              </a:tr>
+              <a:tr h="464820">
+                <a:tc>
+                  <a:txBody>
+                    <a:bodyPr/>
+                    <a:p>
+                      <a:pPr algn="l" fontAlgn="ctr"/>
+                      <a:r>
+                        <a:rPr lang="en-US" altLang="zh-CN" sz="1200" b="0" i="0">
+                          <a:solidFill>
+                            <a:srgbClr val="404040"/>
+                          </a:solidFill>
+                          <a:latin typeface="Calibri"/>
+                          <a:ea typeface="Calibri"/>
+                        </a:rPr>
+                        <a:t>Scaling</a:t>
+                      </a:r>
+                      <a:endParaRPr lang="en-US" altLang="zh-CN" sz="1200" b="0" i="0">
+                        <a:solidFill>
+                          <a:srgbClr val="404040"/>
+                        </a:solidFill>
+                        <a:latin typeface="Calibri"/>
+                        <a:ea typeface="Calibri"/>
+                      </a:endParaRPr>
+                    </a:p>
+                  </a:txBody>
+                  <a:tcPr marL="13017" marR="13017" marT="13017" marB="0" anchor="ctr" anchorCtr="0">
+                    <a:lnL w="6350" cap="flat" cmpd="sng">
+                      <a:solidFill>
+                        <a:srgbClr val="000000"/>
+                      </a:solidFill>
+                      <a:prstDash val="solid"/>
+                      <a:headEnd type="none" w="med" len="med"/>
+                      <a:tailEnd type="none" w="med" len="med"/>
+                    </a:lnL>
+                    <a:lnR w="6350" cap="flat" cmpd="sng">
+                      <a:solidFill>
+                        <a:srgbClr val="000000"/>
+                      </a:solidFill>
+                      <a:prstDash val="solid"/>
+                      <a:headEnd type="none" w="med" len="med"/>
+                      <a:tailEnd type="none" w="med" len="med"/>
+                    </a:lnR>
+                    <a:lnT w="6350" cap="flat" cmpd="sng">
+                      <a:solidFill>
+                        <a:srgbClr val="000000"/>
+                      </a:solidFill>
+                      <a:prstDash val="solid"/>
+                      <a:headEnd type="none" w="med" len="med"/>
+                      <a:tailEnd type="none" w="med" len="med"/>
+                    </a:lnT>
+                    <a:lnB w="6350" cap="flat" cmpd="sng">
+                      <a:solidFill>
+                        <a:srgbClr val="000000"/>
+                      </a:solidFill>
+                      <a:prstDash val="solid"/>
+                      <a:headEnd type="none" w="med" len="med"/>
+                      <a:tailEnd type="none" w="med" len="med"/>
+                    </a:lnB>
+                    <a:solidFill>
+                      <a:srgbClr val="B5C6EA"/>
+                    </a:solidFill>
+                  </a:tcPr>
+                </a:tc>
+                <a:tc>
+                  <a:txBody>
+                    <a:bodyPr/>
+                    <a:p>
+                      <a:pPr algn="l" fontAlgn="ctr"/>
+                      <a:r>
+                        <a:rPr lang="en-US" altLang="zh-CN" sz="1200" b="0" i="0">
+                          <a:solidFill>
+                            <a:srgbClr val="404040"/>
+                          </a:solidFill>
+                          <a:latin typeface="Calibri"/>
+                          <a:ea typeface="Calibri"/>
+                        </a:rPr>
+                        <a:t>Vertical only</a:t>
+                      </a:r>
+                      <a:endParaRPr lang="en-US" altLang="zh-CN" sz="1200" b="0" i="0">
+                        <a:solidFill>
+                          <a:srgbClr val="404040"/>
+                        </a:solidFill>
+                        <a:latin typeface="Calibri"/>
+                        <a:ea typeface="Calibri"/>
+                      </a:endParaRPr>
+                    </a:p>
+                  </a:txBody>
+                  <a:tcPr marL="13017" marR="13017" marT="13017" marB="0" anchor="ctr" anchorCtr="0">
+                    <a:lnL w="6350" cap="flat" cmpd="sng">
+                      <a:solidFill>
+                        <a:srgbClr val="000000"/>
+                      </a:solidFill>
+                      <a:prstDash val="solid"/>
+                      <a:headEnd type="none" w="med" len="med"/>
+                      <a:tailEnd type="none" w="med" len="med"/>
+                    </a:lnL>
+                    <a:lnR w="6350" cap="flat" cmpd="sng">
+                      <a:solidFill>
+                        <a:srgbClr val="000000"/>
+                      </a:solidFill>
+                      <a:prstDash val="solid"/>
+                      <a:headEnd type="none" w="med" len="med"/>
+                      <a:tailEnd type="none" w="med" len="med"/>
+                    </a:lnR>
+                    <a:lnT w="6350" cap="flat" cmpd="sng">
+                      <a:solidFill>
+                        <a:srgbClr val="000000"/>
+                      </a:solidFill>
+                      <a:prstDash val="solid"/>
+                      <a:headEnd type="none" w="med" len="med"/>
+                      <a:tailEnd type="none" w="med" len="med"/>
+                    </a:lnT>
+                    <a:lnB w="6350" cap="flat" cmpd="sng">
+                      <a:solidFill>
+                        <a:srgbClr val="000000"/>
+                      </a:solidFill>
+                      <a:prstDash val="solid"/>
+                      <a:headEnd type="none" w="med" len="med"/>
+                      <a:tailEnd type="none" w="med" len="med"/>
+                    </a:lnB>
+                    <a:noFill/>
+                  </a:tcPr>
+                </a:tc>
+                <a:tc>
+                  <a:txBody>
+                    <a:bodyPr/>
+                    <a:p>
+                      <a:pPr algn="l" fontAlgn="ctr"/>
+                      <a:r>
+                        <a:rPr lang="en-US" altLang="zh-CN" sz="1200" b="1" i="0">
+                          <a:solidFill>
+                            <a:srgbClr val="404040"/>
+                          </a:solidFill>
+                          <a:latin typeface="Calibri"/>
+                          <a:ea typeface="Calibri"/>
+                        </a:rPr>
+                        <a:t>Auto-scaling per service</a:t>
+                      </a:r>
+                      <a:endParaRPr lang="en-US" altLang="zh-CN" sz="1200" b="1" i="0">
+                        <a:solidFill>
+                          <a:srgbClr val="404040"/>
+                        </a:solidFill>
+                        <a:latin typeface="Calibri"/>
+                        <a:ea typeface="Calibri"/>
+                      </a:endParaRPr>
+                    </a:p>
+                  </a:txBody>
+                  <a:tcPr marL="13017" marR="13017" marT="13017" marB="0" anchor="ctr" anchorCtr="0">
+                    <a:lnL w="6350" cap="flat" cmpd="sng">
+                      <a:solidFill>
+                        <a:srgbClr val="000000"/>
+                      </a:solidFill>
+                      <a:prstDash val="solid"/>
+                      <a:headEnd type="none" w="med" len="med"/>
+                      <a:tailEnd type="none" w="med" len="med"/>
+                    </a:lnL>
+                    <a:lnR w="6350" cap="flat" cmpd="sng">
+                      <a:solidFill>
+                        <a:srgbClr val="000000"/>
+                      </a:solidFill>
+                      <a:prstDash val="solid"/>
+                      <a:headEnd type="none" w="med" len="med"/>
+                      <a:tailEnd type="none" w="med" len="med"/>
+                    </a:lnR>
+                    <a:lnT w="6350" cap="flat" cmpd="sng">
+                      <a:solidFill>
+                        <a:srgbClr val="000000"/>
+                      </a:solidFill>
+                      <a:prstDash val="solid"/>
+                      <a:headEnd type="none" w="med" len="med"/>
+                      <a:tailEnd type="none" w="med" len="med"/>
+                    </a:lnT>
+                    <a:lnB w="6350" cap="flat" cmpd="sng">
+                      <a:solidFill>
+                        <a:srgbClr val="000000"/>
+                      </a:solidFill>
+                      <a:prstDash val="solid"/>
+                      <a:headEnd type="none" w="med" len="med"/>
+                      <a:tailEnd type="none" w="med" len="med"/>
+                    </a:lnB>
+                    <a:noFill/>
+                  </a:tcPr>
+                </a:tc>
+              </a:tr>
+              <a:tr h="464820">
+                <a:tc>
+                  <a:txBody>
+                    <a:bodyPr/>
+                    <a:p>
+                      <a:pPr algn="l" fontAlgn="ctr"/>
+                      <a:r>
+                        <a:rPr lang="en-US" altLang="zh-CN" sz="1200" b="0" i="0">
+                          <a:solidFill>
+                            <a:srgbClr val="404040"/>
+                          </a:solidFill>
+                          <a:latin typeface="Calibri"/>
+                          <a:ea typeface="Calibri"/>
+                        </a:rPr>
+                        <a:t>Deployments</a:t>
+                      </a:r>
+                      <a:endParaRPr lang="en-US" altLang="zh-CN" sz="1200" b="0" i="0">
+                        <a:solidFill>
+                          <a:srgbClr val="404040"/>
+                        </a:solidFill>
+                        <a:latin typeface="Calibri"/>
+                        <a:ea typeface="Calibri"/>
+                      </a:endParaRPr>
+                    </a:p>
+                  </a:txBody>
+                  <a:tcPr marL="13017" marR="13017" marT="13017" marB="0" anchor="ctr" anchorCtr="0">
+                    <a:lnL w="6350" cap="flat" cmpd="sng">
+                      <a:solidFill>
+                        <a:srgbClr val="000000"/>
+                      </a:solidFill>
+                      <a:prstDash val="solid"/>
+                      <a:headEnd type="none" w="med" len="med"/>
+                      <a:tailEnd type="none" w="med" len="med"/>
+                    </a:lnL>
+                    <a:lnR w="6350" cap="flat" cmpd="sng">
+                      <a:solidFill>
+                        <a:srgbClr val="000000"/>
+                      </a:solidFill>
+                      <a:prstDash val="solid"/>
+                      <a:headEnd type="none" w="med" len="med"/>
+                      <a:tailEnd type="none" w="med" len="med"/>
+                    </a:lnR>
+                    <a:lnT w="6350" cap="flat" cmpd="sng">
+                      <a:solidFill>
+                        <a:srgbClr val="000000"/>
+                      </a:solidFill>
+                      <a:prstDash val="solid"/>
+                      <a:headEnd type="none" w="med" len="med"/>
+                      <a:tailEnd type="none" w="med" len="med"/>
+                    </a:lnT>
+                    <a:lnB w="6350" cap="flat" cmpd="sng">
+                      <a:solidFill>
+                        <a:srgbClr val="000000"/>
+                      </a:solidFill>
+                      <a:prstDash val="solid"/>
+                      <a:headEnd type="none" w="med" len="med"/>
+                      <a:tailEnd type="none" w="med" len="med"/>
+                    </a:lnB>
+                    <a:solidFill>
+                      <a:srgbClr val="B5C6EA"/>
+                    </a:solidFill>
+                  </a:tcPr>
+                </a:tc>
+                <a:tc>
+                  <a:txBody>
+                    <a:bodyPr/>
+                    <a:p>
+                      <a:pPr algn="l" fontAlgn="ctr"/>
+                      <a:r>
+                        <a:rPr lang="en-US" altLang="zh-CN" sz="1200" b="0" i="0">
+                          <a:solidFill>
+                            <a:srgbClr val="404040"/>
+                          </a:solidFill>
+                          <a:latin typeface="Calibri"/>
+                          <a:ea typeface="Calibri"/>
+                        </a:rPr>
+                        <a:t>High-risk</a:t>
+                      </a:r>
+                      <a:endParaRPr lang="en-US" altLang="zh-CN" sz="1200" b="0" i="0">
+                        <a:solidFill>
+                          <a:srgbClr val="404040"/>
+                        </a:solidFill>
+                        <a:latin typeface="Calibri"/>
+                        <a:ea typeface="Calibri"/>
+                      </a:endParaRPr>
+                    </a:p>
+                  </a:txBody>
+                  <a:tcPr marL="13017" marR="13017" marT="13017" marB="0" anchor="ctr" anchorCtr="0">
+                    <a:lnL w="6350" cap="flat" cmpd="sng">
+                      <a:solidFill>
+                        <a:srgbClr val="000000"/>
+                      </a:solidFill>
+                      <a:prstDash val="solid"/>
+                      <a:headEnd type="none" w="med" len="med"/>
+                      <a:tailEnd type="none" w="med" len="med"/>
+                    </a:lnL>
+                    <a:lnR w="6350" cap="flat" cmpd="sng">
+                      <a:solidFill>
+                        <a:srgbClr val="000000"/>
+                      </a:solidFill>
+                      <a:prstDash val="solid"/>
+                      <a:headEnd type="none" w="med" len="med"/>
+                      <a:tailEnd type="none" w="med" len="med"/>
+                    </a:lnR>
+                    <a:lnT w="6350" cap="flat" cmpd="sng">
+                      <a:solidFill>
+                        <a:srgbClr val="000000"/>
+                      </a:solidFill>
+                      <a:prstDash val="solid"/>
+                      <a:headEnd type="none" w="med" len="med"/>
+                      <a:tailEnd type="none" w="med" len="med"/>
+                    </a:lnT>
+                    <a:lnB w="6350" cap="flat" cmpd="sng">
+                      <a:solidFill>
+                        <a:srgbClr val="000000"/>
+                      </a:solidFill>
+                      <a:prstDash val="solid"/>
+                      <a:headEnd type="none" w="med" len="med"/>
+                      <a:tailEnd type="none" w="med" len="med"/>
+                    </a:lnB>
+                    <a:noFill/>
+                  </a:tcPr>
+                </a:tc>
+                <a:tc>
+                  <a:txBody>
+                    <a:bodyPr/>
+                    <a:p>
+                      <a:pPr algn="l" fontAlgn="ctr"/>
+                      <a:r>
+                        <a:rPr lang="en-US" altLang="zh-CN" sz="1200" b="0" i="0">
+                          <a:solidFill>
+                            <a:srgbClr val="404040"/>
+                          </a:solidFill>
+                          <a:latin typeface="Calibri"/>
+                          <a:ea typeface="Calibri"/>
+                        </a:rPr>
+                        <a:t>Isolated service updates</a:t>
+                      </a:r>
+                      <a:endParaRPr lang="en-US" altLang="zh-CN" sz="1200" b="0" i="0">
+                        <a:solidFill>
+                          <a:srgbClr val="404040"/>
+                        </a:solidFill>
+                        <a:latin typeface="Calibri"/>
+                        <a:ea typeface="Calibri"/>
+                      </a:endParaRPr>
+                    </a:p>
+                  </a:txBody>
+                  <a:tcPr marL="13017" marR="13017" marT="13017" marB="0" anchor="ctr" anchorCtr="0">
+                    <a:lnL w="6350" cap="flat" cmpd="sng">
+                      <a:solidFill>
+                        <a:srgbClr val="000000"/>
+                      </a:solidFill>
+                      <a:prstDash val="solid"/>
+                      <a:headEnd type="none" w="med" len="med"/>
+                      <a:tailEnd type="none" w="med" len="med"/>
+                    </a:lnL>
+                    <a:lnR w="6350" cap="flat" cmpd="sng">
+                      <a:solidFill>
+                        <a:srgbClr val="000000"/>
+                      </a:solidFill>
+                      <a:prstDash val="solid"/>
+                      <a:headEnd type="none" w="med" len="med"/>
+                      <a:tailEnd type="none" w="med" len="med"/>
+                    </a:lnR>
+                    <a:lnT w="6350" cap="flat" cmpd="sng">
+                      <a:solidFill>
+                        <a:srgbClr val="000000"/>
+                      </a:solidFill>
+                      <a:prstDash val="solid"/>
+                      <a:headEnd type="none" w="med" len="med"/>
+                      <a:tailEnd type="none" w="med" len="med"/>
+                    </a:lnT>
+                    <a:lnB w="6350" cap="flat" cmpd="sng">
+                      <a:solidFill>
+                        <a:srgbClr val="000000"/>
+                      </a:solidFill>
+                      <a:prstDash val="solid"/>
+                      <a:headEnd type="none" w="med" len="med"/>
+                      <a:tailEnd type="none" w="med" len="med"/>
+                    </a:lnB>
+                    <a:noFill/>
+                  </a:tcPr>
+                </a:tc>
+              </a:tr>
+              <a:tr h="916940">
+                <a:tc>
+                  <a:txBody>
+                    <a:bodyPr/>
+                    <a:p>
+                      <a:pPr algn="l" fontAlgn="ctr"/>
+                      <a:r>
+                        <a:rPr lang="en-US" altLang="zh-CN" sz="1200" b="0" i="0">
+                          <a:solidFill>
+                            <a:srgbClr val="404040"/>
+                          </a:solidFill>
+                          <a:latin typeface="Calibri"/>
+                          <a:ea typeface="Calibri"/>
+                        </a:rPr>
+                        <a:t>Tech Diversity</a:t>
+                      </a:r>
+                      <a:endParaRPr lang="en-US" altLang="zh-CN" sz="1200" b="0" i="0">
+                        <a:solidFill>
+                          <a:srgbClr val="404040"/>
+                        </a:solidFill>
+                        <a:latin typeface="Calibri"/>
+                        <a:ea typeface="Calibri"/>
+                      </a:endParaRPr>
+                    </a:p>
+                  </a:txBody>
+                  <a:tcPr marL="13017" marR="13017" marT="13017" marB="0" anchor="ctr" anchorCtr="0">
+                    <a:lnL w="6350" cap="flat" cmpd="sng">
+                      <a:solidFill>
+                        <a:srgbClr val="000000"/>
+                      </a:solidFill>
+                      <a:prstDash val="solid"/>
+                      <a:headEnd type="none" w="med" len="med"/>
+                      <a:tailEnd type="none" w="med" len="med"/>
+                    </a:lnL>
+                    <a:lnR w="6350" cap="flat" cmpd="sng">
+                      <a:solidFill>
+                        <a:srgbClr val="000000"/>
+                      </a:solidFill>
+                      <a:prstDash val="solid"/>
+                      <a:headEnd type="none" w="med" len="med"/>
+                      <a:tailEnd type="none" w="med" len="med"/>
+                    </a:lnR>
+                    <a:lnT w="6350" cap="flat" cmpd="sng">
+                      <a:solidFill>
+                        <a:srgbClr val="000000"/>
+                      </a:solidFill>
+                      <a:prstDash val="solid"/>
+                      <a:headEnd type="none" w="med" len="med"/>
+                      <a:tailEnd type="none" w="med" len="med"/>
+                    </a:lnT>
+                    <a:lnB w="6350" cap="flat" cmpd="sng">
+                      <a:solidFill>
+                        <a:srgbClr val="000000"/>
+                      </a:solidFill>
+                      <a:prstDash val="solid"/>
+                      <a:headEnd type="none" w="med" len="med"/>
+                      <a:tailEnd type="none" w="med" len="med"/>
+                    </a:lnB>
+                    <a:solidFill>
+                      <a:srgbClr val="B5C6EA"/>
+                    </a:solidFill>
+                  </a:tcPr>
+                </a:tc>
+                <a:tc>
+                  <a:txBody>
+                    <a:bodyPr/>
+                    <a:p>
+                      <a:pPr algn="l" fontAlgn="ctr"/>
+                      <a:r>
+                        <a:rPr lang="en-US" altLang="zh-CN" sz="1200" b="0" i="0">
+                          <a:solidFill>
+                            <a:srgbClr val="404040"/>
+                          </a:solidFill>
+                          <a:latin typeface="Calibri"/>
+                          <a:ea typeface="Calibri"/>
+                        </a:rPr>
+                        <a:t>Limited</a:t>
+                      </a:r>
+                      <a:endParaRPr lang="en-US" altLang="zh-CN" sz="1200" b="0" i="0">
+                        <a:solidFill>
+                          <a:srgbClr val="404040"/>
+                        </a:solidFill>
+                        <a:latin typeface="Calibri"/>
+                        <a:ea typeface="Calibri"/>
+                      </a:endParaRPr>
+                    </a:p>
+                  </a:txBody>
+                  <a:tcPr marL="13017" marR="13017" marT="13017" marB="0" anchor="ctr" anchorCtr="0">
+                    <a:lnL w="6350" cap="flat" cmpd="sng">
+                      <a:solidFill>
+                        <a:srgbClr val="000000"/>
+                      </a:solidFill>
+                      <a:prstDash val="solid"/>
+                      <a:headEnd type="none" w="med" len="med"/>
+                      <a:tailEnd type="none" w="med" len="med"/>
+                    </a:lnL>
+                    <a:lnR w="6350" cap="flat" cmpd="sng">
+                      <a:solidFill>
+                        <a:srgbClr val="000000"/>
+                      </a:solidFill>
+                      <a:prstDash val="solid"/>
+                      <a:headEnd type="none" w="med" len="med"/>
+                      <a:tailEnd type="none" w="med" len="med"/>
+                    </a:lnR>
+                    <a:lnT w="6350" cap="flat" cmpd="sng">
+                      <a:solidFill>
+                        <a:srgbClr val="000000"/>
+                      </a:solidFill>
+                      <a:prstDash val="solid"/>
+                      <a:headEnd type="none" w="med" len="med"/>
+                      <a:tailEnd type="none" w="med" len="med"/>
+                    </a:lnT>
+                    <a:lnB w="6350" cap="flat" cmpd="sng">
+                      <a:solidFill>
+                        <a:srgbClr val="000000"/>
+                      </a:solidFill>
+                      <a:prstDash val="solid"/>
+                      <a:headEnd type="none" w="med" len="med"/>
+                      <a:tailEnd type="none" w="med" len="med"/>
+                    </a:lnB>
+                    <a:noFill/>
+                  </a:tcPr>
+                </a:tc>
+                <a:tc>
+                  <a:txBody>
+                    <a:bodyPr/>
+                    <a:p>
+                      <a:pPr algn="l" fontAlgn="ctr"/>
+                      <a:r>
+                        <a:rPr lang="en-US" altLang="zh-CN" sz="1200" b="1" i="0">
+                          <a:solidFill>
+                            <a:srgbClr val="404040"/>
+                          </a:solidFill>
+                          <a:latin typeface="Calibri"/>
+                          <a:ea typeface="Calibri"/>
+                        </a:rPr>
+                        <a:t>Polyglot (Spring/React/Mapstruct/GraphQL/NetflixDGS)</a:t>
+                      </a:r>
+                      <a:endParaRPr lang="en-US" altLang="zh-CN" sz="1200" b="1" i="0">
+                        <a:solidFill>
+                          <a:srgbClr val="404040"/>
+                        </a:solidFill>
+                        <a:latin typeface="Calibri"/>
+                        <a:ea typeface="Calibri"/>
+                      </a:endParaRPr>
+                    </a:p>
+                  </a:txBody>
+                  <a:tcPr marL="13017" marR="13017" marT="13017" marB="0" anchor="ctr" anchorCtr="0">
+                    <a:lnL w="6350" cap="flat" cmpd="sng">
+                      <a:solidFill>
+                        <a:srgbClr val="000000"/>
+                      </a:solidFill>
+                      <a:prstDash val="solid"/>
+                      <a:headEnd type="none" w="med" len="med"/>
+                      <a:tailEnd type="none" w="med" len="med"/>
+                    </a:lnL>
+                    <a:lnR w="6350" cap="flat" cmpd="sng">
+                      <a:solidFill>
+                        <a:srgbClr val="000000"/>
+                      </a:solidFill>
+                      <a:prstDash val="solid"/>
+                      <a:headEnd type="none" w="med" len="med"/>
+                      <a:tailEnd type="none" w="med" len="med"/>
+                    </a:lnR>
+                    <a:lnT w="6350" cap="flat" cmpd="sng">
+                      <a:solidFill>
+                        <a:srgbClr val="000000"/>
+                      </a:solidFill>
+                      <a:prstDash val="solid"/>
+                      <a:headEnd type="none" w="med" len="med"/>
+                      <a:tailEnd type="none" w="med" len="med"/>
+                    </a:lnT>
+                    <a:lnB w="6350" cap="flat" cmpd="sng">
+                      <a:solidFill>
+                        <a:srgbClr val="000000"/>
+                      </a:solidFill>
+                      <a:prstDash val="solid"/>
+                      <a:headEnd type="none" w="med" len="med"/>
+                      <a:tailEnd type="none" w="med" len="med"/>
+                    </a:lnB>
+                    <a:noFill/>
+                  </a:tcPr>
+                </a:tc>
+              </a:tr>
+              <a:tr h="464820">
+                <a:tc>
+                  <a:txBody>
+                    <a:bodyPr/>
+                    <a:p>
+                      <a:pPr algn="l" fontAlgn="ctr"/>
+                      <a:r>
+                        <a:rPr lang="en-US" altLang="zh-CN" sz="1200" b="1" i="0">
+                          <a:solidFill>
+                            <a:srgbClr val="404040"/>
+                          </a:solidFill>
+                          <a:latin typeface="Calibri"/>
+                          <a:ea typeface="Calibri"/>
+                        </a:rPr>
+                        <a:t>Speed to Market</a:t>
+                      </a:r>
+                      <a:endParaRPr lang="en-US" altLang="zh-CN" sz="1200" b="1" i="0">
+                        <a:solidFill>
+                          <a:srgbClr val="404040"/>
+                        </a:solidFill>
+                        <a:latin typeface="Calibri"/>
+                        <a:ea typeface="Calibri"/>
+                      </a:endParaRPr>
+                    </a:p>
+                  </a:txBody>
+                  <a:tcPr marL="13017" marR="13017" marT="13017" marB="0" anchor="ctr" anchorCtr="0">
+                    <a:lnL w="6350" cap="flat" cmpd="sng">
+                      <a:solidFill>
+                        <a:srgbClr val="000000"/>
+                      </a:solidFill>
+                      <a:prstDash val="solid"/>
+                      <a:headEnd type="none" w="med" len="med"/>
+                      <a:tailEnd type="none" w="med" len="med"/>
+                    </a:lnL>
+                    <a:lnR w="6350" cap="flat" cmpd="sng">
+                      <a:solidFill>
+                        <a:srgbClr val="000000"/>
+                      </a:solidFill>
+                      <a:prstDash val="solid"/>
+                      <a:headEnd type="none" w="med" len="med"/>
+                      <a:tailEnd type="none" w="med" len="med"/>
+                    </a:lnR>
+                    <a:lnT w="6350" cap="flat" cmpd="sng">
+                      <a:solidFill>
+                        <a:srgbClr val="000000"/>
+                      </a:solidFill>
+                      <a:prstDash val="solid"/>
+                      <a:headEnd type="none" w="med" len="med"/>
+                      <a:tailEnd type="none" w="med" len="med"/>
+                    </a:lnT>
+                    <a:lnB w="6350" cap="flat" cmpd="sng">
+                      <a:solidFill>
+                        <a:srgbClr val="000000"/>
+                      </a:solidFill>
+                      <a:prstDash val="solid"/>
+                      <a:headEnd type="none" w="med" len="med"/>
+                      <a:tailEnd type="none" w="med" len="med"/>
+                    </a:lnB>
+                    <a:solidFill>
+                      <a:srgbClr val="B5C6EA"/>
+                    </a:solidFill>
+                  </a:tcPr>
+                </a:tc>
+                <a:tc>
+                  <a:txBody>
+                    <a:bodyPr/>
+                    <a:p>
+                      <a:pPr algn="l" fontAlgn="ctr"/>
+                      <a:r>
+                        <a:rPr lang="en-US" altLang="zh-CN" sz="1200" b="0" i="0">
+                          <a:solidFill>
+                            <a:srgbClr val="404040"/>
+                          </a:solidFill>
+                          <a:latin typeface="Calibri"/>
+                          <a:ea typeface="Calibri"/>
+                        </a:rPr>
+                        <a:t>Fastest</a:t>
+                      </a:r>
+                      <a:endParaRPr lang="en-US" altLang="zh-CN" sz="1200" b="0" i="0">
+                        <a:solidFill>
+                          <a:srgbClr val="404040"/>
+                        </a:solidFill>
+                        <a:latin typeface="Calibri"/>
+                        <a:ea typeface="Calibri"/>
+                      </a:endParaRPr>
+                    </a:p>
+                  </a:txBody>
+                  <a:tcPr marL="13017" marR="13017" marT="13017" marB="0" anchor="ctr" anchorCtr="0">
+                    <a:lnL w="6350" cap="flat" cmpd="sng">
+                      <a:solidFill>
+                        <a:srgbClr val="000000"/>
+                      </a:solidFill>
+                      <a:prstDash val="solid"/>
+                      <a:headEnd type="none" w="med" len="med"/>
+                      <a:tailEnd type="none" w="med" len="med"/>
+                    </a:lnL>
+                    <a:lnR w="6350" cap="flat" cmpd="sng">
+                      <a:solidFill>
+                        <a:srgbClr val="000000"/>
+                      </a:solidFill>
+                      <a:prstDash val="solid"/>
+                      <a:headEnd type="none" w="med" len="med"/>
+                      <a:tailEnd type="none" w="med" len="med"/>
+                    </a:lnR>
+                    <a:lnT w="6350" cap="flat" cmpd="sng">
+                      <a:solidFill>
+                        <a:srgbClr val="000000"/>
+                      </a:solidFill>
+                      <a:prstDash val="solid"/>
+                      <a:headEnd type="none" w="med" len="med"/>
+                      <a:tailEnd type="none" w="med" len="med"/>
+                    </a:lnT>
+                    <a:lnB w="6350" cap="flat" cmpd="sng">
+                      <a:solidFill>
+                        <a:srgbClr val="000000"/>
+                      </a:solidFill>
+                      <a:prstDash val="solid"/>
+                      <a:headEnd type="none" w="med" len="med"/>
+                      <a:tailEnd type="none" w="med" len="med"/>
+                    </a:lnB>
+                    <a:noFill/>
+                  </a:tcPr>
+                </a:tc>
+                <a:tc>
+                  <a:txBody>
+                    <a:bodyPr/>
+                    <a:p>
+                      <a:pPr algn="l" fontAlgn="ctr"/>
+                      <a:r>
+                        <a:rPr lang="en-US" altLang="zh-CN" sz="1200" b="0" i="0">
+                          <a:solidFill>
+                            <a:srgbClr val="404040"/>
+                          </a:solidFill>
+                          <a:latin typeface="Calibri"/>
+                          <a:ea typeface="Calibri"/>
+                        </a:rPr>
+                        <a:t>Slower init</a:t>
+                      </a:r>
+                      <a:endParaRPr lang="en-US" altLang="zh-CN" sz="1200" b="0" i="0">
+                        <a:solidFill>
+                          <a:srgbClr val="404040"/>
+                        </a:solidFill>
+                        <a:latin typeface="Calibri"/>
+                        <a:ea typeface="Calibri"/>
+                      </a:endParaRPr>
+                    </a:p>
+                  </a:txBody>
+                  <a:tcPr marL="13017" marR="13017" marT="13017" marB="0" anchor="ctr" anchorCtr="0">
+                    <a:lnL w="6350" cap="flat" cmpd="sng">
+                      <a:solidFill>
+                        <a:srgbClr val="000000"/>
+                      </a:solidFill>
+                      <a:prstDash val="solid"/>
+                      <a:headEnd type="none" w="med" len="med"/>
+                      <a:tailEnd type="none" w="med" len="med"/>
+                    </a:lnL>
+                    <a:lnR w="6350" cap="flat" cmpd="sng">
+                      <a:solidFill>
+                        <a:srgbClr val="000000"/>
+                      </a:solidFill>
+                      <a:prstDash val="solid"/>
+                      <a:headEnd type="none" w="med" len="med"/>
+                      <a:tailEnd type="none" w="med" len="med"/>
+                    </a:lnR>
+                    <a:lnT w="6350" cap="flat" cmpd="sng">
+                      <a:solidFill>
+                        <a:srgbClr val="000000"/>
+                      </a:solidFill>
+                      <a:prstDash val="solid"/>
+                      <a:headEnd type="none" w="med" len="med"/>
+                      <a:tailEnd type="none" w="med" len="med"/>
+                    </a:lnT>
+                    <a:lnB w="6350" cap="flat" cmpd="sng">
+                      <a:solidFill>
+                        <a:srgbClr val="000000"/>
+                      </a:solidFill>
+                      <a:prstDash val="solid"/>
+                      <a:headEnd type="none" w="med" len="med"/>
+                      <a:tailEnd type="none" w="med" len="med"/>
+                    </a:lnB>
+                    <a:noFill/>
+                  </a:tcPr>
+                </a:tc>
+              </a:tr>
+              <a:tr h="438785">
+                <a:tc>
+                  <a:txBody>
+                    <a:bodyPr/>
+                    <a:p>
+                      <a:pPr algn="l" fontAlgn="ctr"/>
+                      <a:r>
+                        <a:rPr lang="en-US" altLang="zh-CN" sz="1200" b="1" i="0">
+                          <a:solidFill>
+                            <a:srgbClr val="404040"/>
+                          </a:solidFill>
+                          <a:latin typeface="Calibri"/>
+                          <a:ea typeface="Calibri"/>
+                        </a:rPr>
+                        <a:t>Complexity</a:t>
+                      </a:r>
+                      <a:endParaRPr lang="en-US" altLang="zh-CN" sz="1200" b="1" i="0">
+                        <a:solidFill>
+                          <a:srgbClr val="404040"/>
+                        </a:solidFill>
+                        <a:latin typeface="Calibri"/>
+                        <a:ea typeface="Calibri"/>
+                      </a:endParaRPr>
+                    </a:p>
+                  </a:txBody>
+                  <a:tcPr marL="13017" marR="13017" marT="13017" marB="0" anchor="ctr" anchorCtr="0">
+                    <a:lnL w="6350" cap="flat" cmpd="sng">
+                      <a:solidFill>
+                        <a:srgbClr val="000000"/>
+                      </a:solidFill>
+                      <a:prstDash val="solid"/>
+                      <a:headEnd type="none" w="med" len="med"/>
+                      <a:tailEnd type="none" w="med" len="med"/>
+                    </a:lnL>
+                    <a:lnR w="6350" cap="flat" cmpd="sng">
+                      <a:solidFill>
+                        <a:srgbClr val="000000"/>
+                      </a:solidFill>
+                      <a:prstDash val="solid"/>
+                      <a:headEnd type="none" w="med" len="med"/>
+                      <a:tailEnd type="none" w="med" len="med"/>
+                    </a:lnR>
+                    <a:lnT w="6350" cap="flat" cmpd="sng">
+                      <a:solidFill>
+                        <a:srgbClr val="000000"/>
+                      </a:solidFill>
+                      <a:prstDash val="solid"/>
+                      <a:headEnd type="none" w="med" len="med"/>
+                      <a:tailEnd type="none" w="med" len="med"/>
+                    </a:lnT>
+                    <a:lnB w="6350" cap="flat" cmpd="sng">
+                      <a:solidFill>
+                        <a:srgbClr val="000000"/>
+                      </a:solidFill>
+                      <a:prstDash val="solid"/>
+                      <a:headEnd type="none" w="med" len="med"/>
+                      <a:tailEnd type="none" w="med" len="med"/>
+                    </a:lnB>
+                    <a:solidFill>
+                      <a:srgbClr val="B5C6EA"/>
+                    </a:solidFill>
+                  </a:tcPr>
+                </a:tc>
+                <a:tc>
+                  <a:txBody>
+                    <a:bodyPr/>
+                    <a:p>
+                      <a:pPr algn="l" fontAlgn="ctr"/>
+                      <a:r>
+                        <a:rPr lang="en-US" altLang="zh-CN" sz="1200" b="0" i="0">
+                          <a:solidFill>
+                            <a:srgbClr val="404040"/>
+                          </a:solidFill>
+                          <a:latin typeface="Calibri"/>
+                          <a:ea typeface="Calibri"/>
+                        </a:rPr>
+                        <a:t>Low</a:t>
+                      </a:r>
+                      <a:endParaRPr lang="en-US" altLang="zh-CN" sz="1200" b="0" i="0">
+                        <a:solidFill>
+                          <a:srgbClr val="404040"/>
+                        </a:solidFill>
+                        <a:latin typeface="Calibri"/>
+                        <a:ea typeface="Calibri"/>
+                      </a:endParaRPr>
+                    </a:p>
+                  </a:txBody>
+                  <a:tcPr marL="13017" marR="13017" marT="13017" marB="0" anchor="ctr" anchorCtr="0">
+                    <a:lnL w="6350" cap="flat" cmpd="sng">
+                      <a:solidFill>
+                        <a:srgbClr val="000000"/>
+                      </a:solidFill>
+                      <a:prstDash val="solid"/>
+                      <a:headEnd type="none" w="med" len="med"/>
+                      <a:tailEnd type="none" w="med" len="med"/>
+                    </a:lnL>
+                    <a:lnR w="6350" cap="flat" cmpd="sng">
+                      <a:solidFill>
+                        <a:srgbClr val="000000"/>
+                      </a:solidFill>
+                      <a:prstDash val="solid"/>
+                      <a:headEnd type="none" w="med" len="med"/>
+                      <a:tailEnd type="none" w="med" len="med"/>
+                    </a:lnR>
+                    <a:lnT w="6350" cap="flat" cmpd="sng">
+                      <a:solidFill>
+                        <a:srgbClr val="000000"/>
+                      </a:solidFill>
+                      <a:prstDash val="solid"/>
+                      <a:headEnd type="none" w="med" len="med"/>
+                      <a:tailEnd type="none" w="med" len="med"/>
+                    </a:lnT>
+                    <a:lnB w="6350" cap="flat" cmpd="sng">
+                      <a:solidFill>
+                        <a:srgbClr val="000000"/>
+                      </a:solidFill>
+                      <a:prstDash val="solid"/>
+                      <a:headEnd type="none" w="med" len="med"/>
+                      <a:tailEnd type="none" w="med" len="med"/>
+                    </a:lnB>
+                    <a:noFill/>
+                  </a:tcPr>
+                </a:tc>
+                <a:tc>
+                  <a:txBody>
+                    <a:bodyPr/>
+                    <a:p>
+                      <a:pPr algn="l" fontAlgn="ctr"/>
+                      <a:r>
+                        <a:rPr lang="en-US" altLang="zh-CN" sz="1200" b="1" i="0">
+                          <a:solidFill>
+                            <a:srgbClr val="404040"/>
+                          </a:solidFill>
+                          <a:latin typeface="Calibri"/>
+                          <a:ea typeface="Calibri"/>
+                        </a:rPr>
+                        <a:t>Very High</a:t>
+                      </a:r>
+                      <a:endParaRPr lang="en-US" altLang="zh-CN" sz="1200" b="1" i="0">
+                        <a:solidFill>
+                          <a:srgbClr val="404040"/>
+                        </a:solidFill>
+                        <a:latin typeface="Calibri"/>
+                        <a:ea typeface="Calibri"/>
+                      </a:endParaRPr>
+                    </a:p>
+                  </a:txBody>
+                  <a:tcPr marL="13017" marR="13017" marT="13017" marB="0" anchor="ctr" anchorCtr="0">
+                    <a:lnL w="6350" cap="flat" cmpd="sng">
+                      <a:solidFill>
+                        <a:srgbClr val="000000"/>
+                      </a:solidFill>
+                      <a:prstDash val="solid"/>
+                      <a:headEnd type="none" w="med" len="med"/>
+                      <a:tailEnd type="none" w="med" len="med"/>
+                    </a:lnL>
+                    <a:lnR w="6350" cap="flat" cmpd="sng">
+                      <a:solidFill>
+                        <a:srgbClr val="000000"/>
+                      </a:solidFill>
+                      <a:prstDash val="solid"/>
+                      <a:headEnd type="none" w="med" len="med"/>
+                      <a:tailEnd type="none" w="med" len="med"/>
+                    </a:lnR>
+                    <a:lnT w="6350" cap="flat" cmpd="sng">
+                      <a:solidFill>
+                        <a:srgbClr val="000000"/>
+                      </a:solidFill>
+                      <a:prstDash val="solid"/>
+                      <a:headEnd type="none" w="med" len="med"/>
+                      <a:tailEnd type="none" w="med" len="med"/>
+                    </a:lnT>
+                    <a:lnB w="6350" cap="flat" cmpd="sng">
+                      <a:solidFill>
+                        <a:srgbClr val="000000"/>
+                      </a:solidFill>
+                      <a:prstDash val="solid"/>
+                      <a:headEnd type="none" w="med" len="med"/>
+                      <a:tailEnd type="none" w="med" len="med"/>
+                    </a:lnB>
+                    <a:noFill/>
+                  </a:tcPr>
+                </a:tc>
+              </a:tr>
+            </a:tbl>
+          </a:graphicData>
+        </a:graphic>
+      </p:graphicFrame>
+    </p:spTree>
+  </p:cSld>
+  <p:clrMapOvr>
+    <a:masterClrMapping/>
+  </p:clrMapOvr>
+</p:sld>
+</file>
+
+<file path=ppt/slides/slide5.xml><?xml version="1.0" encoding="utf-8"?>
+<p:sld xmlns:a="http://schemas.openxmlformats.org/drawingml/2006/main" xmlns:r="http://schemas.openxmlformats.org/officeDocument/2006/relationships" xmlns:p="http://schemas.openxmlformats.org/presentationml/2006/main">
+  <p:cSld>
+    <p:spTree>
+      <p:nvGrpSpPr>
+        <p:cNvPr id="1" name=""/>
+        <p:cNvGrpSpPr/>
+        <p:nvPr/>
+      </p:nvGrpSpPr>
+      <p:grpSpPr/>
+      <p:sp>
+        <p:nvSpPr>
+          <p:cNvPr id="2" name="Title 1"/>
+          <p:cNvSpPr>
+            <a:spLocks noGrp="1"/>
+          </p:cNvSpPr>
+          <p:nvPr>
+            <p:ph type="title"/>
+          </p:nvPr>
+        </p:nvSpPr>
+        <p:spPr>
+          <a:xfrm>
+            <a:off x="8690610" y="327660"/>
+            <a:ext cx="3361055" cy="610235"/>
+          </a:xfrm>
+        </p:spPr>
+        <p:txBody>
+          <a:bodyPr>
+            <a:normAutofit fontScale="90000"/>
+          </a:bodyPr>
+          <a:p>
+            <a:r>
+              <a:rPr lang="en-US"/>
+              <a:t>Development</a:t>
+            </a:r>
+            <a:br>
+              <a:rPr lang="en-US"/>
+            </a:br>
+            <a:r>
+              <a:rPr lang="en-US"/>
+              <a:t> roadmap</a:t>
+            </a:r>
+            <a:endParaRPr lang="en-US"/>
+          </a:p>
+        </p:txBody>
+      </p:sp>
+      <p:sp>
+        <p:nvSpPr>
+          <p:cNvPr id="4" name="Text Box 3"/>
+          <p:cNvSpPr txBox="1"/>
+          <p:nvPr/>
+        </p:nvSpPr>
+        <p:spPr>
+          <a:xfrm>
+            <a:off x="8616315" y="2151380"/>
+            <a:ext cx="3575685" cy="4322445"/>
+          </a:xfrm>
+          <a:prstGeom prst="rect">
+            <a:avLst/>
+          </a:prstGeom>
+          <a:noFill/>
+        </p:spPr>
+        <p:txBody>
+          <a:bodyPr wrap="square" rtlCol="0">
+            <a:noAutofit/>
+          </a:bodyPr>
+          <a:p>
+            <a:r>
+              <a:rPr lang="en-US" altLang="en-US"/>
+              <a:t>Requirements, Analysis, architecture Design(High level, low level), UI design, database design, deployment design, Testing design, Scalability and data security test</a:t>
+            </a:r>
+            <a:endParaRPr lang="en-US" altLang="en-US"/>
+          </a:p>
+        </p:txBody>
+      </p:sp>
       <p:pic>
         <p:nvPicPr>
-          <p:cNvPr id="4" name="Picture 3" descr="Jpm-wm-hld"/>
+          <p:cNvPr id="7" name="Picture 6"/>
           <p:cNvPicPr>
             <a:picLocks noChangeAspect="1"/>
           </p:cNvPicPr>
@@ -3973,43 +5958,14 @@
         </p:blipFill>
         <p:spPr>
           <a:xfrm>
-            <a:off x="552450" y="0"/>
-            <a:ext cx="11229975" cy="6752590"/>
+            <a:off x="271145" y="0"/>
+            <a:ext cx="8101330" cy="6858000"/>
           </a:xfrm>
           <a:prstGeom prst="rect">
             <a:avLst/>
           </a:prstGeom>
         </p:spPr>
       </p:pic>
-      <p:sp>
-        <p:nvSpPr>
-          <p:cNvPr id="2" name="Title 1"/>
-          <p:cNvSpPr>
-            <a:spLocks noGrp="1"/>
-          </p:cNvSpPr>
-          <p:nvPr>
-            <p:ph type="title"/>
-          </p:nvPr>
-        </p:nvSpPr>
-        <p:spPr>
-          <a:xfrm>
-            <a:off x="228600" y="258445"/>
-            <a:ext cx="10934700" cy="727710"/>
-          </a:xfrm>
-        </p:spPr>
-        <p:txBody>
-          <a:bodyPr>
-            <a:normAutofit fontScale="90000"/>
-          </a:bodyPr>
-          <a:p>
-            <a:r>
-              <a:rPr lang="en-US"/>
-              <a:t>Architecture</a:t>
-            </a:r>
-            <a:endParaRPr lang="en-US"/>
-          </a:p>
-        </p:txBody>
-      </p:sp>
     </p:spTree>
   </p:cSld>
   <p:clrMapOvr>
@@ -4018,7 +5974,78 @@
 </p:sld>
 </file>
 
-<file path=ppt/slides/slide5.xml><?xml version="1.0" encoding="utf-8"?>
+<file path=ppt/slides/slide6.xml><?xml version="1.0" encoding="utf-8"?>
+<p:sld xmlns:a="http://schemas.openxmlformats.org/drawingml/2006/main" xmlns:r="http://schemas.openxmlformats.org/officeDocument/2006/relationships" xmlns:p="http://schemas.openxmlformats.org/presentationml/2006/main">
+  <p:cSld>
+    <p:spTree>
+      <p:nvGrpSpPr>
+        <p:cNvPr id="1" name=""/>
+        <p:cNvGrpSpPr/>
+        <p:nvPr/>
+      </p:nvGrpSpPr>
+      <p:grpSpPr/>
+      <p:pic>
+        <p:nvPicPr>
+          <p:cNvPr id="5" name="Picture 4" descr="Jpm-wm-hld"/>
+          <p:cNvPicPr>
+            <a:picLocks noChangeAspect="1"/>
+          </p:cNvPicPr>
+          <p:nvPr/>
+        </p:nvPicPr>
+        <p:blipFill>
+          <a:blip r:embed="rId1"/>
+          <a:stretch>
+            <a:fillRect/>
+          </a:stretch>
+        </p:blipFill>
+        <p:spPr>
+          <a:xfrm>
+            <a:off x="929640" y="0"/>
+            <a:ext cx="10030460" cy="6858000"/>
+          </a:xfrm>
+          <a:prstGeom prst="rect">
+            <a:avLst/>
+          </a:prstGeom>
+        </p:spPr>
+      </p:pic>
+      <p:sp>
+        <p:nvSpPr>
+          <p:cNvPr id="2" name="Title 1"/>
+          <p:cNvSpPr>
+            <a:spLocks noGrp="1"/>
+          </p:cNvSpPr>
+          <p:nvPr>
+            <p:ph type="title"/>
+          </p:nvPr>
+        </p:nvSpPr>
+        <p:spPr>
+          <a:xfrm>
+            <a:off x="228600" y="258445"/>
+            <a:ext cx="10934700" cy="727710"/>
+          </a:xfrm>
+        </p:spPr>
+        <p:txBody>
+          <a:bodyPr>
+            <a:normAutofit fontScale="90000"/>
+          </a:bodyPr>
+          <a:p>
+            <a:r>
+              <a:rPr lang="en-US"/>
+              <a:t>Architecture</a:t>
+            </a:r>
+            <a:endParaRPr lang="en-US"/>
+          </a:p>
+        </p:txBody>
+      </p:sp>
+    </p:spTree>
+  </p:cSld>
+  <p:clrMapOvr>
+    <a:masterClrMapping/>
+  </p:clrMapOvr>
+</p:sld>
+</file>
+
+<file path=ppt/slides/slide7.xml><?xml version="1.0" encoding="utf-8"?>
 <p:sld xmlns:a="http://schemas.openxmlformats.org/drawingml/2006/main" xmlns:r="http://schemas.openxmlformats.org/officeDocument/2006/relationships" xmlns:p="http://schemas.openxmlformats.org/presentationml/2006/main">
   <p:cSld>
     <p:spTree>
@@ -4044,7 +6071,7 @@
         </p:blipFill>
         <p:spPr>
           <a:xfrm>
-            <a:off x="2537460" y="258445"/>
+            <a:off x="3619500" y="409575"/>
             <a:ext cx="8427720" cy="6328410"/>
           </a:xfrm>
           <a:prstGeom prst="rect">
@@ -4064,8 +6091,8 @@
         </p:nvSpPr>
         <p:spPr>
           <a:xfrm>
-            <a:off x="188595" y="179070"/>
-            <a:ext cx="2458085" cy="2628265"/>
+            <a:off x="188595" y="-297180"/>
+            <a:ext cx="3156585" cy="2477135"/>
           </a:xfrm>
         </p:spPr>
         <p:txBody>
@@ -4075,7 +6102,43 @@
           <a:p>
             <a:r>
               <a:rPr lang="en-US"/>
-              <a:t>Low level design</a:t>
+              <a:t>Three tier architecture</a:t>
+            </a:r>
+            <a:endParaRPr lang="en-US"/>
+          </a:p>
+        </p:txBody>
+      </p:sp>
+      <p:sp>
+        <p:nvSpPr>
+          <p:cNvPr id="5" name="Text Box 4"/>
+          <p:cNvSpPr txBox="1"/>
+          <p:nvPr/>
+        </p:nvSpPr>
+        <p:spPr>
+          <a:xfrm>
+            <a:off x="466725" y="3429000"/>
+            <a:ext cx="4064000" cy="645160"/>
+          </a:xfrm>
+          <a:prstGeom prst="rect">
+            <a:avLst/>
+          </a:prstGeom>
+          <a:noFill/>
+        </p:spPr>
+        <p:txBody>
+          <a:bodyPr wrap="square" rtlCol="0">
+            <a:spAutoFit/>
+          </a:bodyPr>
+          <a:p>
+            <a:r>
+              <a:rPr lang="en-US"/>
+              <a:t>User activity with API mapping </a:t>
+            </a:r>
+            <a:endParaRPr lang="en-US"/>
+          </a:p>
+          <a:p>
+            <a:r>
+              <a:rPr lang="en-US"/>
+              <a:t>diagram</a:t>
             </a:r>
             <a:endParaRPr lang="en-US"/>
           </a:p>
@@ -4089,7 +6152,7 @@
 </p:sld>
 </file>
 
-<file path=ppt/slides/slide6.xml><?xml version="1.0" encoding="utf-8"?>
+<file path=ppt/slides/slide8.xml><?xml version="1.0" encoding="utf-8"?>
 <p:sld xmlns:a="http://schemas.openxmlformats.org/drawingml/2006/main" xmlns:r="http://schemas.openxmlformats.org/officeDocument/2006/relationships" xmlns:p="http://schemas.openxmlformats.org/presentationml/2006/main">
   <p:cSld>
     <p:spTree>
@@ -4115,7 +6178,7 @@
         </p:blipFill>
         <p:spPr>
           <a:xfrm>
-            <a:off x="1344295" y="258445"/>
+            <a:off x="2158365" y="258445"/>
             <a:ext cx="9293860" cy="6100445"/>
           </a:xfrm>
           <a:prstGeom prst="rect">
@@ -4135,8 +6198,8 @@
         </p:nvSpPr>
         <p:spPr>
           <a:xfrm>
-            <a:off x="647700" y="258445"/>
-            <a:ext cx="10515600" cy="619760"/>
+            <a:off x="194310" y="258445"/>
+            <a:ext cx="10968990" cy="619760"/>
           </a:xfrm>
         </p:spPr>
         <p:txBody>
@@ -4146,138 +6209,8 @@
           <a:p>
             <a:r>
               <a:rPr lang="en-US"/>
-              <a:t>Data design</a:t>
-            </a:r>
-            <a:endParaRPr lang="en-US"/>
-          </a:p>
-        </p:txBody>
-      </p:sp>
-    </p:spTree>
-  </p:cSld>
-  <p:clrMapOvr>
-    <a:masterClrMapping/>
-  </p:clrMapOvr>
-</p:sld>
-</file>
-
-<file path=ppt/slides/slide7.xml><?xml version="1.0" encoding="utf-8"?>
-<p:sld xmlns:a="http://schemas.openxmlformats.org/drawingml/2006/main" xmlns:r="http://schemas.openxmlformats.org/officeDocument/2006/relationships" xmlns:p="http://schemas.openxmlformats.org/presentationml/2006/main">
-  <p:cSld>
-    <p:spTree>
-      <p:nvGrpSpPr>
-        <p:cNvPr id="1" name=""/>
-        <p:cNvGrpSpPr/>
-        <p:nvPr/>
-      </p:nvGrpSpPr>
-      <p:grpSpPr/>
-      <p:sp>
-        <p:nvSpPr>
-          <p:cNvPr id="2" name="Title 1"/>
-          <p:cNvSpPr>
-            <a:spLocks noGrp="1"/>
-          </p:cNvSpPr>
-          <p:nvPr>
-            <p:ph type="title"/>
-          </p:nvPr>
-        </p:nvSpPr>
-        <p:spPr>
-          <a:xfrm>
-            <a:off x="647700" y="258445"/>
-            <a:ext cx="10515600" cy="600710"/>
-          </a:xfrm>
-        </p:spPr>
-        <p:txBody>
-          <a:bodyPr>
-            <a:normAutofit fontScale="90000"/>
-          </a:bodyPr>
-          <a:p>
-            <a:r>
-              <a:rPr lang="en-US"/>
-              <a:t>Implementations</a:t>
-            </a:r>
-            <a:endParaRPr lang="en-US"/>
-          </a:p>
-        </p:txBody>
-      </p:sp>
-      <p:sp>
-        <p:nvSpPr>
-          <p:cNvPr id="3" name="Content Placeholder 2"/>
-          <p:cNvSpPr>
-            <a:spLocks noGrp="1"/>
-          </p:cNvSpPr>
-          <p:nvPr>
-            <p:ph idx="1"/>
-          </p:nvPr>
-        </p:nvSpPr>
-        <p:spPr/>
-        <p:txBody>
-          <a:bodyPr/>
-          <a:p>
-            <a:endParaRPr lang="en-US"/>
-          </a:p>
-        </p:txBody>
-      </p:sp>
-    </p:spTree>
-  </p:cSld>
-  <p:clrMapOvr>
-    <a:masterClrMapping/>
-  </p:clrMapOvr>
-</p:sld>
-</file>
-
-<file path=ppt/slides/slide8.xml><?xml version="1.0" encoding="utf-8"?>
-<p:sld xmlns:a="http://schemas.openxmlformats.org/drawingml/2006/main" xmlns:r="http://schemas.openxmlformats.org/officeDocument/2006/relationships" xmlns:p="http://schemas.openxmlformats.org/presentationml/2006/main">
-  <p:cSld>
-    <p:spTree>
-      <p:nvGrpSpPr>
-        <p:cNvPr id="1" name=""/>
-        <p:cNvGrpSpPr/>
-        <p:nvPr/>
-      </p:nvGrpSpPr>
-      <p:grpSpPr/>
-      <p:sp>
-        <p:nvSpPr>
-          <p:cNvPr id="2" name="Title 1"/>
-          <p:cNvSpPr>
-            <a:spLocks noGrp="1"/>
-          </p:cNvSpPr>
-          <p:nvPr>
-            <p:ph type="title"/>
-          </p:nvPr>
-        </p:nvSpPr>
-        <p:spPr>
-          <a:xfrm>
-            <a:off x="647700" y="258445"/>
-            <a:ext cx="10515600" cy="443230"/>
-          </a:xfrm>
-        </p:spPr>
-        <p:txBody>
-          <a:bodyPr>
-            <a:normAutofit fontScale="90000"/>
-          </a:bodyPr>
-          <a:p>
-            <a:r>
-              <a:rPr lang="en-US"/>
-              <a:t>Demo:</a:t>
-            </a:r>
-            <a:endParaRPr lang="en-US"/>
-          </a:p>
-        </p:txBody>
-      </p:sp>
-      <p:sp>
-        <p:nvSpPr>
-          <p:cNvPr id="3" name="Content Placeholder 2"/>
-          <p:cNvSpPr>
-            <a:spLocks noGrp="1"/>
-          </p:cNvSpPr>
-          <p:nvPr>
-            <p:ph idx="1"/>
-          </p:nvPr>
-        </p:nvSpPr>
-        <p:spPr/>
-        <p:txBody>
-          <a:bodyPr/>
-          <a:p>
+              <a:t>Database design</a:t>
+            </a:r>
             <a:endParaRPr lang="en-US"/>
           </a:p>
         </p:txBody>
@@ -4313,7 +6246,7 @@
         <p:spPr>
           <a:xfrm>
             <a:off x="647700" y="258445"/>
-            <a:ext cx="10515600" cy="610235"/>
+            <a:ext cx="10515600" cy="600710"/>
           </a:xfrm>
         </p:spPr>
         <p:txBody>
@@ -4323,7 +6256,7 @@
           <a:p>
             <a:r>
               <a:rPr lang="en-US"/>
-              <a:t>Reports</a:t>
+              <a:t>Implementations</a:t>
             </a:r>
             <a:endParaRPr lang="en-US"/>
           </a:p>
@@ -4353,6 +6286,13 @@
     <a:masterClrMapping/>
   </p:clrMapOvr>
 </p:sld>
+</file>
+
+<file path=ppt/tags/tag1.xml><?xml version="1.0" encoding="utf-8"?>
+<p:tagLst xmlns:p="http://schemas.openxmlformats.org/presentationml/2006/main">
+  <p:tag name="TABLE_ENDDRAG_ORIGIN_RECT" val="555*285"/>
+  <p:tag name="TABLE_ENDDRAG_RECT" val="78*124*555*285"/>
+</p:tagLst>
 </file>
 
 <file path=ppt/theme/theme1.xml><?xml version="1.0" encoding="utf-8"?>

</xml_diff>